<commit_message>
5. Introducing Variables & Constants
</commit_message>
<xml_diff>
--- a/2. Basics Variables, Data Types, Operators & Functions/docs/Introduction.pptx
+++ b/2. Basics Variables, Data Types, Operators & Functions/docs/Introduction.pptx
@@ -7,6 +7,7 @@
   <p:sldIdLst>
     <p:sldId id="256" r:id="rId2"/>
     <p:sldId id="257" r:id="rId3"/>
+    <p:sldId id="258" r:id="rId4"/>
   </p:sldIdLst>
   <p:sldSz cx="12192000" cy="6858000"/>
   <p:notesSz cx="6858000" cy="9144000"/>
@@ -3512,6 +3513,672 @@
 </p:sld>
 </file>
 
+<file path=ppt/slides/slide3.xml><?xml version="1.0" encoding="utf-8"?>
+<p:sld xmlns:a="http://schemas.openxmlformats.org/drawingml/2006/main" xmlns:r="http://schemas.openxmlformats.org/officeDocument/2006/relationships" xmlns:p="http://schemas.openxmlformats.org/presentationml/2006/main">
+  <p:cSld>
+    <p:spTree>
+      <p:nvGrpSpPr>
+        <p:cNvPr id="1" name=""/>
+        <p:cNvGrpSpPr/>
+        <p:nvPr/>
+      </p:nvGrpSpPr>
+      <p:grpSpPr>
+        <a:xfrm>
+          <a:off x="0" y="0"/>
+          <a:ext cx="0" cy="0"/>
+          <a:chOff x="0" y="0"/>
+          <a:chExt cx="0" cy="0"/>
+        </a:xfrm>
+      </p:grpSpPr>
+      <p:sp>
+        <p:nvSpPr>
+          <p:cNvPr id="2" name="Rectangle 1"/>
+          <p:cNvSpPr/>
+          <p:nvPr/>
+        </p:nvSpPr>
+        <p:spPr>
+          <a:xfrm>
+            <a:off x="798944" y="960581"/>
+            <a:ext cx="3893128" cy="748145"/>
+          </a:xfrm>
+          <a:prstGeom prst="rect">
+            <a:avLst/>
+          </a:prstGeom>
+          <a:solidFill>
+            <a:srgbClr val="660066"/>
+          </a:solidFill>
+          <a:ln>
+            <a:noFill/>
+          </a:ln>
+        </p:spPr>
+        <p:style>
+          <a:lnRef idx="2">
+            <a:schemeClr val="accent1">
+              <a:shade val="50000"/>
+            </a:schemeClr>
+          </a:lnRef>
+          <a:fillRef idx="1">
+            <a:schemeClr val="accent1"/>
+          </a:fillRef>
+          <a:effectRef idx="0">
+            <a:schemeClr val="accent1"/>
+          </a:effectRef>
+          <a:fontRef idx="minor">
+            <a:schemeClr val="lt1"/>
+          </a:fontRef>
+        </p:style>
+        <p:txBody>
+          <a:bodyPr rtlCol="0" anchor="ctr"/>
+          <a:lstStyle/>
+          <a:p>
+            <a:pPr algn="ctr"/>
+            <a:r>
+              <a:rPr lang="en-US" dirty="0" smtClean="0">
+                <a:latin typeface="Calibri (Corps)"/>
+                <a:cs typeface="Segoe UI Light" panose="020B0502040204020203" pitchFamily="34" charset="0"/>
+              </a:rPr>
+              <a:t>Let username = ‘Max’;</a:t>
+            </a:r>
+            <a:endParaRPr lang="en-US" dirty="0">
+              <a:latin typeface="Calibri (Corps)"/>
+              <a:cs typeface="Segoe UI Light" panose="020B0502040204020203" pitchFamily="34" charset="0"/>
+            </a:endParaRPr>
+          </a:p>
+        </p:txBody>
+      </p:sp>
+      <p:sp>
+        <p:nvSpPr>
+          <p:cNvPr id="3" name="ZoneTexte 2"/>
+          <p:cNvSpPr txBox="1"/>
+          <p:nvPr/>
+        </p:nvSpPr>
+        <p:spPr>
+          <a:xfrm>
+            <a:off x="489527" y="193964"/>
+            <a:ext cx="4368799" cy="523220"/>
+          </a:xfrm>
+          <a:prstGeom prst="rect">
+            <a:avLst/>
+          </a:prstGeom>
+          <a:noFill/>
+        </p:spPr>
+        <p:txBody>
+          <a:bodyPr wrap="square" rtlCol="0">
+            <a:spAutoFit/>
+          </a:bodyPr>
+          <a:lstStyle/>
+          <a:p>
+            <a:r>
+              <a:rPr lang="en-US" sz="2800" b="1" dirty="0" smtClean="0">
+                <a:ea typeface="Segoe UI Black" panose="020B0A02040204020203" pitchFamily="34" charset="0"/>
+                <a:cs typeface="Segoe UI Semibold" panose="020B0702040204020203" pitchFamily="34" charset="0"/>
+              </a:rPr>
+              <a:t>Variables &amp; Constants</a:t>
+            </a:r>
+            <a:endParaRPr lang="en-US" sz="2800" b="1" dirty="0">
+              <a:ea typeface="Segoe UI Black" panose="020B0A02040204020203" pitchFamily="34" charset="0"/>
+              <a:cs typeface="Segoe UI Semibold" panose="020B0702040204020203" pitchFamily="34" charset="0"/>
+            </a:endParaRPr>
+          </a:p>
+        </p:txBody>
+      </p:sp>
+      <p:sp>
+        <p:nvSpPr>
+          <p:cNvPr id="7" name="Rectangle 6"/>
+          <p:cNvSpPr/>
+          <p:nvPr/>
+        </p:nvSpPr>
+        <p:spPr>
+          <a:xfrm>
+            <a:off x="6936507" y="960581"/>
+            <a:ext cx="4322620" cy="748145"/>
+          </a:xfrm>
+          <a:prstGeom prst="rect">
+            <a:avLst/>
+          </a:prstGeom>
+          <a:solidFill>
+            <a:srgbClr val="CC3399">
+              <a:alpha val="29020"/>
+            </a:srgbClr>
+          </a:solidFill>
+          <a:ln w="28575">
+            <a:solidFill>
+              <a:srgbClr val="7030A0"/>
+            </a:solidFill>
+          </a:ln>
+        </p:spPr>
+        <p:style>
+          <a:lnRef idx="2">
+            <a:schemeClr val="accent1">
+              <a:shade val="50000"/>
+            </a:schemeClr>
+          </a:lnRef>
+          <a:fillRef idx="1">
+            <a:schemeClr val="accent1"/>
+          </a:fillRef>
+          <a:effectRef idx="0">
+            <a:schemeClr val="accent1"/>
+          </a:effectRef>
+          <a:fontRef idx="minor">
+            <a:schemeClr val="lt1"/>
+          </a:fontRef>
+        </p:style>
+        <p:txBody>
+          <a:bodyPr rtlCol="0" anchor="ctr"/>
+          <a:lstStyle/>
+          <a:p>
+            <a:pPr algn="ctr"/>
+            <a:r>
+              <a:rPr lang="en-US" dirty="0" smtClean="0">
+                <a:solidFill>
+                  <a:srgbClr val="7030A0"/>
+                </a:solidFill>
+                <a:latin typeface="Calibri (Corps)"/>
+                <a:cs typeface="Segoe UI Light" panose="020B0502040204020203" pitchFamily="34" charset="0"/>
+              </a:rPr>
+              <a:t>A “data container” / “data storage”</a:t>
+            </a:r>
+            <a:endParaRPr lang="en-US" dirty="0">
+              <a:solidFill>
+                <a:srgbClr val="7030A0"/>
+              </a:solidFill>
+              <a:latin typeface="Calibri (Corps)"/>
+              <a:cs typeface="Segoe UI Light" panose="020B0502040204020203" pitchFamily="34" charset="0"/>
+            </a:endParaRPr>
+          </a:p>
+        </p:txBody>
+      </p:sp>
+      <p:sp>
+        <p:nvSpPr>
+          <p:cNvPr id="8" name="Rectangle 7"/>
+          <p:cNvSpPr/>
+          <p:nvPr/>
+        </p:nvSpPr>
+        <p:spPr>
+          <a:xfrm>
+            <a:off x="798944" y="2104523"/>
+            <a:ext cx="3893128" cy="748145"/>
+          </a:xfrm>
+          <a:prstGeom prst="rect">
+            <a:avLst/>
+          </a:prstGeom>
+          <a:solidFill>
+            <a:srgbClr val="660066"/>
+          </a:solidFill>
+          <a:ln>
+            <a:noFill/>
+          </a:ln>
+        </p:spPr>
+        <p:style>
+          <a:lnRef idx="2">
+            <a:schemeClr val="accent1">
+              <a:shade val="50000"/>
+            </a:schemeClr>
+          </a:lnRef>
+          <a:fillRef idx="1">
+            <a:schemeClr val="accent1"/>
+          </a:fillRef>
+          <a:effectRef idx="0">
+            <a:schemeClr val="accent1"/>
+          </a:effectRef>
+          <a:fontRef idx="minor">
+            <a:schemeClr val="lt1"/>
+          </a:fontRef>
+        </p:style>
+        <p:txBody>
+          <a:bodyPr rtlCol="0" anchor="ctr"/>
+          <a:lstStyle/>
+          <a:p>
+            <a:pPr algn="ctr"/>
+            <a:r>
+              <a:rPr lang="en-US" dirty="0" smtClean="0">
+                <a:latin typeface="Calibri (Corps)"/>
+                <a:cs typeface="Segoe UI Light" panose="020B0502040204020203" pitchFamily="34" charset="0"/>
+              </a:rPr>
+              <a:t>username = ‘Manu’;</a:t>
+            </a:r>
+            <a:endParaRPr lang="en-US" dirty="0">
+              <a:latin typeface="Calibri (Corps)"/>
+              <a:cs typeface="Segoe UI Light" panose="020B0502040204020203" pitchFamily="34" charset="0"/>
+            </a:endParaRPr>
+          </a:p>
+        </p:txBody>
+      </p:sp>
+      <p:sp>
+        <p:nvSpPr>
+          <p:cNvPr id="9" name="Rectangle 8"/>
+          <p:cNvSpPr/>
+          <p:nvPr/>
+        </p:nvSpPr>
+        <p:spPr>
+          <a:xfrm>
+            <a:off x="6936507" y="2104523"/>
+            <a:ext cx="4322620" cy="748145"/>
+          </a:xfrm>
+          <a:prstGeom prst="rect">
+            <a:avLst/>
+          </a:prstGeom>
+          <a:solidFill>
+            <a:srgbClr val="CC3399">
+              <a:alpha val="29020"/>
+            </a:srgbClr>
+          </a:solidFill>
+          <a:ln w="28575">
+            <a:solidFill>
+              <a:srgbClr val="7030A0"/>
+            </a:solidFill>
+          </a:ln>
+        </p:spPr>
+        <p:style>
+          <a:lnRef idx="2">
+            <a:schemeClr val="accent1">
+              <a:shade val="50000"/>
+            </a:schemeClr>
+          </a:lnRef>
+          <a:fillRef idx="1">
+            <a:schemeClr val="accent1"/>
+          </a:fillRef>
+          <a:effectRef idx="0">
+            <a:schemeClr val="accent1"/>
+          </a:effectRef>
+          <a:fontRef idx="minor">
+            <a:schemeClr val="lt1"/>
+          </a:fontRef>
+        </p:style>
+        <p:txBody>
+          <a:bodyPr rtlCol="0" anchor="ctr"/>
+          <a:lstStyle/>
+          <a:p>
+            <a:pPr algn="ctr"/>
+            <a:r>
+              <a:rPr lang="en-US" dirty="0" smtClean="0">
+                <a:solidFill>
+                  <a:srgbClr val="7030A0"/>
+                </a:solidFill>
+                <a:latin typeface="Calibri (Corps)"/>
+                <a:cs typeface="Segoe UI Light" panose="020B0502040204020203" pitchFamily="34" charset="0"/>
+              </a:rPr>
+              <a:t>… where the value can change!</a:t>
+            </a:r>
+            <a:endParaRPr lang="en-US" dirty="0">
+              <a:solidFill>
+                <a:srgbClr val="7030A0"/>
+              </a:solidFill>
+              <a:latin typeface="Calibri (Corps)"/>
+              <a:cs typeface="Segoe UI Light" panose="020B0502040204020203" pitchFamily="34" charset="0"/>
+            </a:endParaRPr>
+          </a:p>
+        </p:txBody>
+      </p:sp>
+      <p:sp>
+        <p:nvSpPr>
+          <p:cNvPr id="14" name="Rectangle 13"/>
+          <p:cNvSpPr/>
+          <p:nvPr/>
+        </p:nvSpPr>
+        <p:spPr>
+          <a:xfrm>
+            <a:off x="798944" y="3563868"/>
+            <a:ext cx="3893128" cy="748145"/>
+          </a:xfrm>
+          <a:prstGeom prst="rect">
+            <a:avLst/>
+          </a:prstGeom>
+          <a:solidFill>
+            <a:schemeClr val="accent2"/>
+          </a:solidFill>
+          <a:ln>
+            <a:noFill/>
+          </a:ln>
+        </p:spPr>
+        <p:style>
+          <a:lnRef idx="2">
+            <a:schemeClr val="accent1">
+              <a:shade val="50000"/>
+            </a:schemeClr>
+          </a:lnRef>
+          <a:fillRef idx="1">
+            <a:schemeClr val="accent1"/>
+          </a:fillRef>
+          <a:effectRef idx="0">
+            <a:schemeClr val="accent1"/>
+          </a:effectRef>
+          <a:fontRef idx="minor">
+            <a:schemeClr val="lt1"/>
+          </a:fontRef>
+        </p:style>
+        <p:txBody>
+          <a:bodyPr rtlCol="0" anchor="ctr"/>
+          <a:lstStyle/>
+          <a:p>
+            <a:pPr algn="ctr"/>
+            <a:r>
+              <a:rPr lang="en-US" sz="1600" dirty="0" smtClean="0">
+                <a:latin typeface="Calibri (Corps)"/>
+              </a:rPr>
+              <a:t>Const totalUsers = 15;</a:t>
+            </a:r>
+            <a:endParaRPr lang="en-US" sz="1600" dirty="0" smtClean="0">
+              <a:latin typeface="Calibri (Corps)"/>
+            </a:endParaRPr>
+          </a:p>
+        </p:txBody>
+      </p:sp>
+      <p:sp>
+        <p:nvSpPr>
+          <p:cNvPr id="15" name="Rectangle 14"/>
+          <p:cNvSpPr/>
+          <p:nvPr/>
+        </p:nvSpPr>
+        <p:spPr>
+          <a:xfrm>
+            <a:off x="6971144" y="4783067"/>
+            <a:ext cx="4253345" cy="748145"/>
+          </a:xfrm>
+          <a:prstGeom prst="rect">
+            <a:avLst/>
+          </a:prstGeom>
+          <a:solidFill>
+            <a:srgbClr val="FF9900">
+              <a:alpha val="30196"/>
+            </a:srgbClr>
+          </a:solidFill>
+          <a:ln w="28575">
+            <a:solidFill>
+              <a:srgbClr val="FF9933"/>
+            </a:solidFill>
+          </a:ln>
+        </p:spPr>
+        <p:style>
+          <a:lnRef idx="2">
+            <a:schemeClr val="accent1">
+              <a:shade val="50000"/>
+            </a:schemeClr>
+          </a:lnRef>
+          <a:fillRef idx="1">
+            <a:schemeClr val="accent1"/>
+          </a:fillRef>
+          <a:effectRef idx="0">
+            <a:schemeClr val="accent1"/>
+          </a:effectRef>
+          <a:fontRef idx="minor">
+            <a:schemeClr val="lt1"/>
+          </a:fontRef>
+        </p:style>
+        <p:txBody>
+          <a:bodyPr rtlCol="0" anchor="ctr"/>
+          <a:lstStyle/>
+          <a:p>
+            <a:pPr algn="ctr"/>
+            <a:r>
+              <a:rPr lang="en-US" sz="2000" dirty="0" smtClean="0">
+                <a:solidFill>
+                  <a:srgbClr val="FF9900"/>
+                </a:solidFill>
+              </a:rPr>
+              <a:t>… where the value must not change!</a:t>
+            </a:r>
+            <a:endParaRPr lang="en-US" sz="2000" dirty="0" smtClean="0">
+              <a:solidFill>
+                <a:srgbClr val="FF9900"/>
+              </a:solidFill>
+            </a:endParaRPr>
+          </a:p>
+        </p:txBody>
+      </p:sp>
+      <p:sp>
+        <p:nvSpPr>
+          <p:cNvPr id="16" name="Rectangle 15"/>
+          <p:cNvSpPr/>
+          <p:nvPr/>
+        </p:nvSpPr>
+        <p:spPr>
+          <a:xfrm>
+            <a:off x="7005782" y="3563867"/>
+            <a:ext cx="4253345" cy="748145"/>
+          </a:xfrm>
+          <a:prstGeom prst="rect">
+            <a:avLst/>
+          </a:prstGeom>
+          <a:solidFill>
+            <a:srgbClr val="FF9900">
+              <a:alpha val="30196"/>
+            </a:srgbClr>
+          </a:solidFill>
+          <a:ln w="28575">
+            <a:solidFill>
+              <a:srgbClr val="FF9933"/>
+            </a:solidFill>
+          </a:ln>
+        </p:spPr>
+        <p:style>
+          <a:lnRef idx="2">
+            <a:schemeClr val="accent1">
+              <a:shade val="50000"/>
+            </a:schemeClr>
+          </a:lnRef>
+          <a:fillRef idx="1">
+            <a:schemeClr val="accent1"/>
+          </a:fillRef>
+          <a:effectRef idx="0">
+            <a:schemeClr val="accent1"/>
+          </a:effectRef>
+          <a:fontRef idx="minor">
+            <a:schemeClr val="lt1"/>
+          </a:fontRef>
+        </p:style>
+        <p:txBody>
+          <a:bodyPr rtlCol="0" anchor="ctr"/>
+          <a:lstStyle/>
+          <a:p>
+            <a:pPr algn="ctr"/>
+            <a:r>
+              <a:rPr lang="en-US" sz="2000" dirty="0" smtClean="0">
+                <a:solidFill>
+                  <a:srgbClr val="FF9900"/>
+                </a:solidFill>
+              </a:rPr>
+              <a:t>A “data container” / “data storage”</a:t>
+            </a:r>
+            <a:endParaRPr lang="en-US" sz="2000" dirty="0" smtClean="0">
+              <a:solidFill>
+                <a:srgbClr val="FF9900"/>
+              </a:solidFill>
+            </a:endParaRPr>
+          </a:p>
+        </p:txBody>
+      </p:sp>
+      <p:sp>
+        <p:nvSpPr>
+          <p:cNvPr id="17" name="Rectangle 16"/>
+          <p:cNvSpPr/>
+          <p:nvPr/>
+        </p:nvSpPr>
+        <p:spPr>
+          <a:xfrm>
+            <a:off x="798944" y="4783068"/>
+            <a:ext cx="3893128" cy="748145"/>
+          </a:xfrm>
+          <a:prstGeom prst="rect">
+            <a:avLst/>
+          </a:prstGeom>
+          <a:solidFill>
+            <a:schemeClr val="accent2"/>
+          </a:solidFill>
+          <a:ln>
+            <a:noFill/>
+          </a:ln>
+        </p:spPr>
+        <p:style>
+          <a:lnRef idx="2">
+            <a:schemeClr val="accent1">
+              <a:shade val="50000"/>
+            </a:schemeClr>
+          </a:lnRef>
+          <a:fillRef idx="1">
+            <a:schemeClr val="accent1"/>
+          </a:fillRef>
+          <a:effectRef idx="0">
+            <a:schemeClr val="accent1"/>
+          </a:effectRef>
+          <a:fontRef idx="minor">
+            <a:schemeClr val="lt1"/>
+          </a:fontRef>
+        </p:style>
+        <p:txBody>
+          <a:bodyPr rtlCol="0" anchor="ctr"/>
+          <a:lstStyle/>
+          <a:p>
+            <a:pPr algn="ctr"/>
+            <a:r>
+              <a:rPr lang="en-US" sz="1600" dirty="0" smtClean="0">
+                <a:latin typeface="Calibri (Corps)"/>
+              </a:rPr>
+              <a:t>totalUsers = 20;</a:t>
+            </a:r>
+            <a:endParaRPr lang="en-US" sz="1600" dirty="0" smtClean="0">
+              <a:latin typeface="Calibri (Corps)"/>
+            </a:endParaRPr>
+          </a:p>
+        </p:txBody>
+      </p:sp>
+      <p:sp>
+        <p:nvSpPr>
+          <p:cNvPr id="18" name="Rectangle 17"/>
+          <p:cNvSpPr/>
+          <p:nvPr/>
+        </p:nvSpPr>
+        <p:spPr>
+          <a:xfrm>
+            <a:off x="2068945" y="5841506"/>
+            <a:ext cx="9155544" cy="679367"/>
+          </a:xfrm>
+          <a:prstGeom prst="rect">
+            <a:avLst/>
+          </a:prstGeom>
+          <a:solidFill>
+            <a:srgbClr val="FFFF00"/>
+          </a:solidFill>
+          <a:ln w="19050">
+            <a:solidFill>
+              <a:schemeClr val="tx1"/>
+            </a:solidFill>
+          </a:ln>
+        </p:spPr>
+        <p:style>
+          <a:lnRef idx="2">
+            <a:schemeClr val="accent1">
+              <a:shade val="50000"/>
+            </a:schemeClr>
+          </a:lnRef>
+          <a:fillRef idx="1">
+            <a:schemeClr val="accent1"/>
+          </a:fillRef>
+          <a:effectRef idx="0">
+            <a:schemeClr val="accent1"/>
+          </a:effectRef>
+          <a:fontRef idx="minor">
+            <a:schemeClr val="lt1"/>
+          </a:fontRef>
+        </p:style>
+        <p:txBody>
+          <a:bodyPr rtlCol="0" anchor="ctr"/>
+          <a:lstStyle/>
+          <a:p>
+            <a:pPr algn="ctr"/>
+            <a:r>
+              <a:rPr lang="en-US" dirty="0" smtClean="0">
+                <a:solidFill>
+                  <a:schemeClr val="tx1"/>
+                </a:solidFill>
+              </a:rPr>
+              <a:t>Use </a:t>
+            </a:r>
+            <a:r>
+              <a:rPr lang="en-US" b="1" dirty="0" smtClean="0">
+                <a:solidFill>
+                  <a:schemeClr val="tx1"/>
+                </a:solidFill>
+              </a:rPr>
+              <a:t>constants as often as possible </a:t>
+            </a:r>
+            <a:r>
+              <a:rPr lang="en-US" dirty="0" smtClean="0">
+                <a:solidFill>
+                  <a:schemeClr val="tx1"/>
+                </a:solidFill>
+              </a:rPr>
+              <a:t>(i.e. whenever you actually got data that never changes) to be clear about your intentions (in your code)</a:t>
+            </a:r>
+            <a:endParaRPr lang="en-US" dirty="0">
+              <a:solidFill>
+                <a:schemeClr val="tx1"/>
+              </a:solidFill>
+            </a:endParaRPr>
+          </a:p>
+        </p:txBody>
+      </p:sp>
+      <p:sp>
+        <p:nvSpPr>
+          <p:cNvPr id="19" name="Flèche droite 18"/>
+          <p:cNvSpPr/>
+          <p:nvPr/>
+        </p:nvSpPr>
+        <p:spPr>
+          <a:xfrm>
+            <a:off x="798943" y="5872738"/>
+            <a:ext cx="1168402" cy="616902"/>
+          </a:xfrm>
+          <a:prstGeom prst="rightArrow">
+            <a:avLst/>
+          </a:prstGeom>
+          <a:solidFill>
+            <a:srgbClr val="FFFF00"/>
+          </a:solidFill>
+          <a:ln w="28575">
+            <a:solidFill>
+              <a:schemeClr val="tx1"/>
+            </a:solidFill>
+          </a:ln>
+        </p:spPr>
+        <p:style>
+          <a:lnRef idx="2">
+            <a:schemeClr val="accent1">
+              <a:shade val="50000"/>
+            </a:schemeClr>
+          </a:lnRef>
+          <a:fillRef idx="1">
+            <a:schemeClr val="accent1"/>
+          </a:fillRef>
+          <a:effectRef idx="0">
+            <a:schemeClr val="accent1"/>
+          </a:effectRef>
+          <a:fontRef idx="minor">
+            <a:schemeClr val="lt1"/>
+          </a:fontRef>
+        </p:style>
+        <p:txBody>
+          <a:bodyPr rtlCol="0" anchor="ctr"/>
+          <a:lstStyle/>
+          <a:p>
+            <a:pPr algn="ctr"/>
+            <a:endParaRPr lang="en-US"/>
+          </a:p>
+        </p:txBody>
+      </p:sp>
+    </p:spTree>
+    <p:extLst>
+      <p:ext uri="{BB962C8B-B14F-4D97-AF65-F5344CB8AC3E}">
+        <p14:creationId xmlns:p14="http://schemas.microsoft.com/office/powerpoint/2010/main" val="1008225285"/>
+      </p:ext>
+    </p:extLst>
+  </p:cSld>
+  <p:clrMapOvr>
+    <a:masterClrMapping/>
+  </p:clrMapOvr>
+</p:sld>
+</file>
+
 <file path=ppt/theme/theme1.xml><?xml version="1.0" encoding="utf-8"?>
 <a:theme xmlns:a="http://schemas.openxmlformats.org/drawingml/2006/main" name="Thème Office">
   <a:themeElements>

</xml_diff>

<commit_message>
6. Declaring & Defining Variables
</commit_message>
<xml_diff>
--- a/2. Basics Variables, Data Types, Operators & Functions/docs/Introduction.pptx
+++ b/2. Basics Variables, Data Types, Operators & Functions/docs/Introduction.pptx
@@ -8,6 +8,7 @@
     <p:sldId id="256" r:id="rId2"/>
     <p:sldId id="257" r:id="rId3"/>
     <p:sldId id="258" r:id="rId4"/>
+    <p:sldId id="259" r:id="rId5"/>
   </p:sldIdLst>
   <p:sldSz cx="12192000" cy="6858000"/>
   <p:notesSz cx="6858000" cy="9144000"/>
@@ -3858,9 +3859,6 @@
               </a:rPr>
               <a:t>Const totalUsers = 15;</a:t>
             </a:r>
-            <a:endParaRPr lang="en-US" sz="1600" dirty="0" smtClean="0">
-              <a:latin typeface="Calibri (Corps)"/>
-            </a:endParaRPr>
           </a:p>
         </p:txBody>
       </p:sp>
@@ -3918,11 +3916,6 @@
               </a:rPr>
               <a:t>… where the value must not change!</a:t>
             </a:r>
-            <a:endParaRPr lang="en-US" sz="2000" dirty="0" smtClean="0">
-              <a:solidFill>
-                <a:srgbClr val="FF9900"/>
-              </a:solidFill>
-            </a:endParaRPr>
           </a:p>
         </p:txBody>
       </p:sp>
@@ -3980,11 +3973,6 @@
               </a:rPr>
               <a:t>A “data container” / “data storage”</a:t>
             </a:r>
-            <a:endParaRPr lang="en-US" sz="2000" dirty="0" smtClean="0">
-              <a:solidFill>
-                <a:srgbClr val="FF9900"/>
-              </a:solidFill>
-            </a:endParaRPr>
           </a:p>
         </p:txBody>
       </p:sp>
@@ -4036,9 +4024,6 @@
               </a:rPr>
               <a:t>totalUsers = 20;</a:t>
             </a:r>
-            <a:endParaRPr lang="en-US" sz="1600" dirty="0" smtClean="0">
-              <a:latin typeface="Calibri (Corps)"/>
-            </a:endParaRPr>
           </a:p>
         </p:txBody>
       </p:sp>
@@ -4170,6 +4155,1339 @@
     <p:extLst>
       <p:ext uri="{BB962C8B-B14F-4D97-AF65-F5344CB8AC3E}">
         <p14:creationId xmlns:p14="http://schemas.microsoft.com/office/powerpoint/2010/main" val="1008225285"/>
+      </p:ext>
+    </p:extLst>
+  </p:cSld>
+  <p:clrMapOvr>
+    <a:masterClrMapping/>
+  </p:clrMapOvr>
+</p:sld>
+</file>
+
+<file path=ppt/slides/slide4.xml><?xml version="1.0" encoding="utf-8"?>
+<p:sld xmlns:a="http://schemas.openxmlformats.org/drawingml/2006/main" xmlns:r="http://schemas.openxmlformats.org/officeDocument/2006/relationships" xmlns:p="http://schemas.openxmlformats.org/presentationml/2006/main">
+  <p:cSld>
+    <p:spTree>
+      <p:nvGrpSpPr>
+        <p:cNvPr id="1" name=""/>
+        <p:cNvGrpSpPr/>
+        <p:nvPr/>
+      </p:nvGrpSpPr>
+      <p:grpSpPr>
+        <a:xfrm>
+          <a:off x="0" y="0"/>
+          <a:ext cx="0" cy="0"/>
+          <a:chOff x="0" y="0"/>
+          <a:chExt cx="0" cy="0"/>
+        </a:xfrm>
+      </p:grpSpPr>
+      <p:sp>
+        <p:nvSpPr>
+          <p:cNvPr id="4" name="Rectangle 3"/>
+          <p:cNvSpPr/>
+          <p:nvPr/>
+        </p:nvSpPr>
+        <p:spPr>
+          <a:xfrm>
+            <a:off x="752761" y="783723"/>
+            <a:ext cx="4770583" cy="546313"/>
+          </a:xfrm>
+          <a:prstGeom prst="rect">
+            <a:avLst/>
+          </a:prstGeom>
+          <a:solidFill>
+            <a:schemeClr val="accent6"/>
+          </a:solidFill>
+          <a:ln>
+            <a:noFill/>
+          </a:ln>
+        </p:spPr>
+        <p:style>
+          <a:lnRef idx="2">
+            <a:schemeClr val="accent1">
+              <a:shade val="50000"/>
+            </a:schemeClr>
+          </a:lnRef>
+          <a:fillRef idx="1">
+            <a:schemeClr val="accent1"/>
+          </a:fillRef>
+          <a:effectRef idx="0">
+            <a:schemeClr val="accent1"/>
+          </a:effectRef>
+          <a:fontRef idx="minor">
+            <a:schemeClr val="lt1"/>
+          </a:fontRef>
+        </p:style>
+        <p:txBody>
+          <a:bodyPr rtlCol="0" anchor="ctr"/>
+          <a:lstStyle/>
+          <a:p>
+            <a:pPr algn="ctr"/>
+            <a:r>
+              <a:rPr lang="en-US" dirty="0" smtClean="0">
+                <a:latin typeface="Calibri (Corps)"/>
+                <a:cs typeface="Segoe UI Light" panose="020B0502040204020203" pitchFamily="34" charset="0"/>
+              </a:rPr>
+              <a:t>Allowed</a:t>
+            </a:r>
+            <a:endParaRPr lang="en-US" dirty="0">
+              <a:latin typeface="Calibri (Corps)"/>
+              <a:cs typeface="Segoe UI Light" panose="020B0502040204020203" pitchFamily="34" charset="0"/>
+            </a:endParaRPr>
+          </a:p>
+        </p:txBody>
+      </p:sp>
+      <p:sp>
+        <p:nvSpPr>
+          <p:cNvPr id="5" name="ZoneTexte 4"/>
+          <p:cNvSpPr txBox="1"/>
+          <p:nvPr/>
+        </p:nvSpPr>
+        <p:spPr>
+          <a:xfrm>
+            <a:off x="561108" y="83127"/>
+            <a:ext cx="4368799" cy="523220"/>
+          </a:xfrm>
+          <a:prstGeom prst="rect">
+            <a:avLst/>
+          </a:prstGeom>
+          <a:noFill/>
+        </p:spPr>
+        <p:txBody>
+          <a:bodyPr wrap="square" rtlCol="0">
+            <a:spAutoFit/>
+          </a:bodyPr>
+          <a:lstStyle/>
+          <a:p>
+            <a:r>
+              <a:rPr lang="en-US" sz="2800" b="1" dirty="0" smtClean="0">
+                <a:ea typeface="Segoe UI Black" panose="020B0A02040204020203" pitchFamily="34" charset="0"/>
+                <a:cs typeface="Segoe UI Semibold" panose="020B0702040204020203" pitchFamily="34" charset="0"/>
+              </a:rPr>
+              <a:t>Variables Naming</a:t>
+            </a:r>
+            <a:endParaRPr lang="en-US" sz="2800" b="1" dirty="0">
+              <a:ea typeface="Segoe UI Black" panose="020B0A02040204020203" pitchFamily="34" charset="0"/>
+              <a:cs typeface="Segoe UI Semibold" panose="020B0702040204020203" pitchFamily="34" charset="0"/>
+            </a:endParaRPr>
+          </a:p>
+        </p:txBody>
+      </p:sp>
+      <p:sp>
+        <p:nvSpPr>
+          <p:cNvPr id="6" name="Rectangle 5"/>
+          <p:cNvSpPr/>
+          <p:nvPr/>
+        </p:nvSpPr>
+        <p:spPr>
+          <a:xfrm>
+            <a:off x="752761" y="1494922"/>
+            <a:ext cx="3015674" cy="748145"/>
+          </a:xfrm>
+          <a:prstGeom prst="rect">
+            <a:avLst/>
+          </a:prstGeom>
+          <a:solidFill>
+            <a:schemeClr val="accent6">
+              <a:lumMod val="60000"/>
+              <a:lumOff val="40000"/>
+            </a:schemeClr>
+          </a:solidFill>
+          <a:ln w="28575">
+            <a:solidFill>
+              <a:schemeClr val="accent6">
+                <a:lumMod val="75000"/>
+              </a:schemeClr>
+            </a:solidFill>
+          </a:ln>
+        </p:spPr>
+        <p:style>
+          <a:lnRef idx="2">
+            <a:schemeClr val="accent1">
+              <a:shade val="50000"/>
+            </a:schemeClr>
+          </a:lnRef>
+          <a:fillRef idx="1">
+            <a:schemeClr val="accent1"/>
+          </a:fillRef>
+          <a:effectRef idx="0">
+            <a:schemeClr val="accent1"/>
+          </a:effectRef>
+          <a:fontRef idx="minor">
+            <a:schemeClr val="lt1"/>
+          </a:fontRef>
+        </p:style>
+        <p:txBody>
+          <a:bodyPr rtlCol="0" anchor="ctr"/>
+          <a:lstStyle/>
+          <a:p>
+            <a:pPr algn="ctr"/>
+            <a:r>
+              <a:rPr lang="en-US" dirty="0" smtClean="0">
+                <a:solidFill>
+                  <a:schemeClr val="accent6">
+                    <a:lumMod val="75000"/>
+                  </a:schemeClr>
+                </a:solidFill>
+                <a:latin typeface="Calibri (Corps)"/>
+                <a:cs typeface="Segoe UI Light" panose="020B0502040204020203" pitchFamily="34" charset="0"/>
+              </a:rPr>
+              <a:t>Let userName</a:t>
+            </a:r>
+            <a:endParaRPr lang="en-US" dirty="0">
+              <a:solidFill>
+                <a:schemeClr val="accent6">
+                  <a:lumMod val="75000"/>
+                </a:schemeClr>
+              </a:solidFill>
+              <a:latin typeface="Calibri (Corps)"/>
+              <a:cs typeface="Segoe UI Light" panose="020B0502040204020203" pitchFamily="34" charset="0"/>
+            </a:endParaRPr>
+          </a:p>
+        </p:txBody>
+      </p:sp>
+      <p:sp>
+        <p:nvSpPr>
+          <p:cNvPr id="7" name="Rectangle 6"/>
+          <p:cNvSpPr/>
+          <p:nvPr/>
+        </p:nvSpPr>
+        <p:spPr>
+          <a:xfrm>
+            <a:off x="3971634" y="1494922"/>
+            <a:ext cx="1551710" cy="748145"/>
+          </a:xfrm>
+          <a:prstGeom prst="rect">
+            <a:avLst/>
+          </a:prstGeom>
+          <a:solidFill>
+            <a:srgbClr val="FFFF00"/>
+          </a:solidFill>
+          <a:ln w="28575">
+            <a:solidFill>
+              <a:schemeClr val="tx1"/>
+            </a:solidFill>
+          </a:ln>
+        </p:spPr>
+        <p:style>
+          <a:lnRef idx="2">
+            <a:schemeClr val="accent1">
+              <a:shade val="50000"/>
+            </a:schemeClr>
+          </a:lnRef>
+          <a:fillRef idx="1">
+            <a:schemeClr val="accent1"/>
+          </a:fillRef>
+          <a:effectRef idx="0">
+            <a:schemeClr val="accent1"/>
+          </a:effectRef>
+          <a:fontRef idx="minor">
+            <a:schemeClr val="lt1"/>
+          </a:fontRef>
+        </p:style>
+        <p:txBody>
+          <a:bodyPr rtlCol="0" anchor="ctr"/>
+          <a:lstStyle/>
+          <a:p>
+            <a:pPr algn="ctr"/>
+            <a:r>
+              <a:rPr lang="en-US" dirty="0" smtClean="0">
+                <a:solidFill>
+                  <a:schemeClr val="tx1"/>
+                </a:solidFill>
+              </a:rPr>
+              <a:t>Best Practice:</a:t>
+            </a:r>
+          </a:p>
+          <a:p>
+            <a:pPr algn="ctr"/>
+            <a:r>
+              <a:rPr lang="en-US" b="1" dirty="0" smtClean="0">
+                <a:solidFill>
+                  <a:schemeClr val="tx1"/>
+                </a:solidFill>
+              </a:rPr>
+              <a:t>camelCase</a:t>
+            </a:r>
+            <a:endParaRPr lang="en-US" b="1" dirty="0">
+              <a:solidFill>
+                <a:schemeClr val="tx1"/>
+              </a:solidFill>
+            </a:endParaRPr>
+          </a:p>
+        </p:txBody>
+      </p:sp>
+      <p:sp>
+        <p:nvSpPr>
+          <p:cNvPr id="8" name="Rectangle 7"/>
+          <p:cNvSpPr/>
+          <p:nvPr/>
+        </p:nvSpPr>
+        <p:spPr>
+          <a:xfrm>
+            <a:off x="752761" y="5529340"/>
+            <a:ext cx="10238512" cy="665018"/>
+          </a:xfrm>
+          <a:prstGeom prst="rect">
+            <a:avLst/>
+          </a:prstGeom>
+          <a:solidFill>
+            <a:srgbClr val="C00000"/>
+          </a:solidFill>
+          <a:ln>
+            <a:noFill/>
+          </a:ln>
+        </p:spPr>
+        <p:style>
+          <a:lnRef idx="2">
+            <a:schemeClr val="accent1">
+              <a:shade val="50000"/>
+            </a:schemeClr>
+          </a:lnRef>
+          <a:fillRef idx="1">
+            <a:schemeClr val="accent1"/>
+          </a:fillRef>
+          <a:effectRef idx="0">
+            <a:schemeClr val="accent1"/>
+          </a:effectRef>
+          <a:fontRef idx="minor">
+            <a:schemeClr val="lt1"/>
+          </a:fontRef>
+        </p:style>
+        <p:txBody>
+          <a:bodyPr rtlCol="0" anchor="ctr"/>
+          <a:lstStyle/>
+          <a:p>
+            <a:pPr algn="ctr"/>
+            <a:r>
+              <a:rPr lang="en-US" dirty="0" smtClean="0"/>
+              <a:t>Let </a:t>
+            </a:r>
+            <a:r>
+              <a:rPr lang="en-US" b="1" dirty="0" smtClean="0">
+                <a:solidFill>
+                  <a:schemeClr val="tx1"/>
+                </a:solidFill>
+              </a:rPr>
+              <a:t>whatTheUserEntred</a:t>
+            </a:r>
+            <a:r>
+              <a:rPr lang="en-US" dirty="0" smtClean="0">
+                <a:solidFill>
+                  <a:schemeClr val="tx1"/>
+                </a:solidFill>
+              </a:rPr>
+              <a:t> </a:t>
+            </a:r>
+            <a:r>
+              <a:rPr lang="en-US" dirty="0" smtClean="0">
+                <a:solidFill>
+                  <a:schemeClr val="bg1"/>
+                </a:solidFill>
+              </a:rPr>
+              <a:t>would be technically correct (i.e. you get no error) but it </a:t>
+            </a:r>
+            <a:r>
+              <a:rPr lang="en-US" b="1" dirty="0" smtClean="0">
+                <a:solidFill>
+                  <a:schemeClr val="tx1"/>
+                </a:solidFill>
+              </a:rPr>
+              <a:t>doesn’t give any hint </a:t>
+            </a:r>
+            <a:r>
+              <a:rPr lang="en-US" dirty="0" smtClean="0">
+                <a:solidFill>
+                  <a:schemeClr val="bg1"/>
+                </a:solidFill>
+              </a:rPr>
+              <a:t>about the purpose of this variable.</a:t>
+            </a:r>
+            <a:r>
+              <a:rPr lang="en-US" dirty="0" smtClean="0"/>
+              <a:t> </a:t>
+            </a:r>
+            <a:endParaRPr lang="en-US" dirty="0"/>
+          </a:p>
+        </p:txBody>
+      </p:sp>
+      <p:sp>
+        <p:nvSpPr>
+          <p:cNvPr id="9" name="Rectangle 8"/>
+          <p:cNvSpPr/>
+          <p:nvPr/>
+        </p:nvSpPr>
+        <p:spPr>
+          <a:xfrm>
+            <a:off x="752761" y="2532131"/>
+            <a:ext cx="3015674" cy="748145"/>
+          </a:xfrm>
+          <a:prstGeom prst="rect">
+            <a:avLst/>
+          </a:prstGeom>
+          <a:solidFill>
+            <a:schemeClr val="accent6">
+              <a:lumMod val="60000"/>
+              <a:lumOff val="40000"/>
+            </a:schemeClr>
+          </a:solidFill>
+          <a:ln w="28575">
+            <a:solidFill>
+              <a:schemeClr val="accent6">
+                <a:lumMod val="75000"/>
+              </a:schemeClr>
+            </a:solidFill>
+          </a:ln>
+        </p:spPr>
+        <p:style>
+          <a:lnRef idx="2">
+            <a:schemeClr val="accent1">
+              <a:shade val="50000"/>
+            </a:schemeClr>
+          </a:lnRef>
+          <a:fillRef idx="1">
+            <a:schemeClr val="accent1"/>
+          </a:fillRef>
+          <a:effectRef idx="0">
+            <a:schemeClr val="accent1"/>
+          </a:effectRef>
+          <a:fontRef idx="minor">
+            <a:schemeClr val="lt1"/>
+          </a:fontRef>
+        </p:style>
+        <p:txBody>
+          <a:bodyPr rtlCol="0" anchor="ctr"/>
+          <a:lstStyle/>
+          <a:p>
+            <a:pPr algn="ctr"/>
+            <a:r>
+              <a:rPr lang="en-US" dirty="0" smtClean="0">
+                <a:solidFill>
+                  <a:schemeClr val="accent6">
+                    <a:lumMod val="75000"/>
+                  </a:schemeClr>
+                </a:solidFill>
+                <a:latin typeface="Calibri (Corps)"/>
+                <a:cs typeface="Segoe UI Light" panose="020B0502040204020203" pitchFamily="34" charset="0"/>
+              </a:rPr>
+              <a:t>Let ageGroup5</a:t>
+            </a:r>
+            <a:endParaRPr lang="en-US" dirty="0">
+              <a:solidFill>
+                <a:schemeClr val="accent6">
+                  <a:lumMod val="75000"/>
+                </a:schemeClr>
+              </a:solidFill>
+              <a:latin typeface="Calibri (Corps)"/>
+              <a:cs typeface="Segoe UI Light" panose="020B0502040204020203" pitchFamily="34" charset="0"/>
+            </a:endParaRPr>
+          </a:p>
+        </p:txBody>
+      </p:sp>
+      <p:sp>
+        <p:nvSpPr>
+          <p:cNvPr id="10" name="Rectangle 9"/>
+          <p:cNvSpPr/>
+          <p:nvPr/>
+        </p:nvSpPr>
+        <p:spPr>
+          <a:xfrm>
+            <a:off x="3971634" y="2539742"/>
+            <a:ext cx="1551710" cy="748145"/>
+          </a:xfrm>
+          <a:prstGeom prst="rect">
+            <a:avLst/>
+          </a:prstGeom>
+          <a:solidFill>
+            <a:srgbClr val="FFFF00"/>
+          </a:solidFill>
+          <a:ln w="28575">
+            <a:solidFill>
+              <a:schemeClr val="tx1"/>
+            </a:solidFill>
+          </a:ln>
+        </p:spPr>
+        <p:style>
+          <a:lnRef idx="2">
+            <a:schemeClr val="accent1">
+              <a:shade val="50000"/>
+            </a:schemeClr>
+          </a:lnRef>
+          <a:fillRef idx="1">
+            <a:schemeClr val="accent1"/>
+          </a:fillRef>
+          <a:effectRef idx="0">
+            <a:schemeClr val="accent1"/>
+          </a:effectRef>
+          <a:fontRef idx="minor">
+            <a:schemeClr val="lt1"/>
+          </a:fontRef>
+        </p:style>
+        <p:txBody>
+          <a:bodyPr rtlCol="0" anchor="ctr"/>
+          <a:lstStyle/>
+          <a:p>
+            <a:pPr algn="ctr"/>
+            <a:r>
+              <a:rPr lang="en-US" dirty="0" smtClean="0">
+                <a:solidFill>
+                  <a:schemeClr val="tx1"/>
+                </a:solidFill>
+              </a:rPr>
+              <a:t>Only letters and digits</a:t>
+            </a:r>
+            <a:endParaRPr lang="en-US" dirty="0" smtClean="0">
+              <a:solidFill>
+                <a:schemeClr val="tx1"/>
+              </a:solidFill>
+            </a:endParaRPr>
+          </a:p>
+        </p:txBody>
+      </p:sp>
+      <p:sp>
+        <p:nvSpPr>
+          <p:cNvPr id="11" name="Rectangle 10"/>
+          <p:cNvSpPr/>
+          <p:nvPr/>
+        </p:nvSpPr>
+        <p:spPr>
+          <a:xfrm>
+            <a:off x="752761" y="3534279"/>
+            <a:ext cx="3015674" cy="748145"/>
+          </a:xfrm>
+          <a:prstGeom prst="rect">
+            <a:avLst/>
+          </a:prstGeom>
+          <a:solidFill>
+            <a:schemeClr val="accent6">
+              <a:lumMod val="60000"/>
+              <a:lumOff val="40000"/>
+            </a:schemeClr>
+          </a:solidFill>
+          <a:ln w="28575">
+            <a:solidFill>
+              <a:schemeClr val="accent6">
+                <a:lumMod val="75000"/>
+              </a:schemeClr>
+            </a:solidFill>
+          </a:ln>
+        </p:spPr>
+        <p:style>
+          <a:lnRef idx="2">
+            <a:schemeClr val="accent1">
+              <a:shade val="50000"/>
+            </a:schemeClr>
+          </a:lnRef>
+          <a:fillRef idx="1">
+            <a:schemeClr val="accent1"/>
+          </a:fillRef>
+          <a:effectRef idx="0">
+            <a:schemeClr val="accent1"/>
+          </a:effectRef>
+          <a:fontRef idx="minor">
+            <a:schemeClr val="lt1"/>
+          </a:fontRef>
+        </p:style>
+        <p:txBody>
+          <a:bodyPr rtlCol="0" anchor="ctr"/>
+          <a:lstStyle/>
+          <a:p>
+            <a:pPr algn="ctr"/>
+            <a:r>
+              <a:rPr lang="en-US" dirty="0" smtClean="0">
+                <a:solidFill>
+                  <a:schemeClr val="accent6">
+                    <a:lumMod val="75000"/>
+                  </a:schemeClr>
+                </a:solidFill>
+                <a:latin typeface="Calibri (Corps)"/>
+                <a:cs typeface="Segoe UI Light" panose="020B0502040204020203" pitchFamily="34" charset="0"/>
+              </a:rPr>
+              <a:t>Let $kindOfSpecial</a:t>
+            </a:r>
+            <a:endParaRPr lang="en-US" dirty="0">
+              <a:solidFill>
+                <a:schemeClr val="accent6">
+                  <a:lumMod val="75000"/>
+                </a:schemeClr>
+              </a:solidFill>
+              <a:latin typeface="Calibri (Corps)"/>
+              <a:cs typeface="Segoe UI Light" panose="020B0502040204020203" pitchFamily="34" charset="0"/>
+            </a:endParaRPr>
+          </a:p>
+        </p:txBody>
+      </p:sp>
+      <p:sp>
+        <p:nvSpPr>
+          <p:cNvPr id="12" name="Rectangle 11"/>
+          <p:cNvSpPr/>
+          <p:nvPr/>
+        </p:nvSpPr>
+        <p:spPr>
+          <a:xfrm>
+            <a:off x="3971634" y="3525896"/>
+            <a:ext cx="1551710" cy="748145"/>
+          </a:xfrm>
+          <a:prstGeom prst="rect">
+            <a:avLst/>
+          </a:prstGeom>
+          <a:solidFill>
+            <a:srgbClr val="FFFF00"/>
+          </a:solidFill>
+          <a:ln w="28575">
+            <a:solidFill>
+              <a:schemeClr val="tx1"/>
+            </a:solidFill>
+          </a:ln>
+        </p:spPr>
+        <p:style>
+          <a:lnRef idx="2">
+            <a:schemeClr val="accent1">
+              <a:shade val="50000"/>
+            </a:schemeClr>
+          </a:lnRef>
+          <a:fillRef idx="1">
+            <a:schemeClr val="accent1"/>
+          </a:fillRef>
+          <a:effectRef idx="0">
+            <a:schemeClr val="accent1"/>
+          </a:effectRef>
+          <a:fontRef idx="minor">
+            <a:schemeClr val="lt1"/>
+          </a:fontRef>
+        </p:style>
+        <p:txBody>
+          <a:bodyPr rtlCol="0" anchor="ctr"/>
+          <a:lstStyle/>
+          <a:p>
+            <a:pPr algn="ctr"/>
+            <a:r>
+              <a:rPr lang="en-US" dirty="0" smtClean="0">
+                <a:solidFill>
+                  <a:schemeClr val="tx1"/>
+                </a:solidFill>
+              </a:rPr>
+              <a:t>Starting with $ is allowed</a:t>
+            </a:r>
+            <a:endParaRPr lang="en-US" dirty="0" smtClean="0">
+              <a:solidFill>
+                <a:schemeClr val="tx1"/>
+              </a:solidFill>
+            </a:endParaRPr>
+          </a:p>
+        </p:txBody>
+      </p:sp>
+      <p:sp>
+        <p:nvSpPr>
+          <p:cNvPr id="13" name="Rectangle 12"/>
+          <p:cNvSpPr/>
+          <p:nvPr/>
+        </p:nvSpPr>
+        <p:spPr>
+          <a:xfrm>
+            <a:off x="752761" y="4536427"/>
+            <a:ext cx="3015674" cy="748145"/>
+          </a:xfrm>
+          <a:prstGeom prst="rect">
+            <a:avLst/>
+          </a:prstGeom>
+          <a:solidFill>
+            <a:schemeClr val="accent6">
+              <a:lumMod val="60000"/>
+              <a:lumOff val="40000"/>
+            </a:schemeClr>
+          </a:solidFill>
+          <a:ln w="28575">
+            <a:solidFill>
+              <a:schemeClr val="accent6">
+                <a:lumMod val="75000"/>
+              </a:schemeClr>
+            </a:solidFill>
+          </a:ln>
+        </p:spPr>
+        <p:style>
+          <a:lnRef idx="2">
+            <a:schemeClr val="accent1">
+              <a:shade val="50000"/>
+            </a:schemeClr>
+          </a:lnRef>
+          <a:fillRef idx="1">
+            <a:schemeClr val="accent1"/>
+          </a:fillRef>
+          <a:effectRef idx="0">
+            <a:schemeClr val="accent1"/>
+          </a:effectRef>
+          <a:fontRef idx="minor">
+            <a:schemeClr val="lt1"/>
+          </a:fontRef>
+        </p:style>
+        <p:txBody>
+          <a:bodyPr rtlCol="0" anchor="ctr"/>
+          <a:lstStyle/>
+          <a:p>
+            <a:pPr algn="ctr"/>
+            <a:r>
+              <a:rPr lang="en-US" dirty="0" smtClean="0">
+                <a:solidFill>
+                  <a:schemeClr val="accent6">
+                    <a:lumMod val="75000"/>
+                  </a:schemeClr>
+                </a:solidFill>
+                <a:latin typeface="Calibri (Corps)"/>
+                <a:cs typeface="Segoe UI Light" panose="020B0502040204020203" pitchFamily="34" charset="0"/>
+              </a:rPr>
+              <a:t>Let _internalValue</a:t>
+            </a:r>
+            <a:endParaRPr lang="en-US" dirty="0">
+              <a:solidFill>
+                <a:schemeClr val="accent6">
+                  <a:lumMod val="75000"/>
+                </a:schemeClr>
+              </a:solidFill>
+              <a:latin typeface="Calibri (Corps)"/>
+              <a:cs typeface="Segoe UI Light" panose="020B0502040204020203" pitchFamily="34" charset="0"/>
+            </a:endParaRPr>
+          </a:p>
+        </p:txBody>
+      </p:sp>
+      <p:sp>
+        <p:nvSpPr>
+          <p:cNvPr id="14" name="Rectangle 13"/>
+          <p:cNvSpPr/>
+          <p:nvPr/>
+        </p:nvSpPr>
+        <p:spPr>
+          <a:xfrm>
+            <a:off x="3971634" y="4536426"/>
+            <a:ext cx="1551710" cy="748145"/>
+          </a:xfrm>
+          <a:prstGeom prst="rect">
+            <a:avLst/>
+          </a:prstGeom>
+          <a:solidFill>
+            <a:srgbClr val="FFFF00"/>
+          </a:solidFill>
+          <a:ln w="28575">
+            <a:solidFill>
+              <a:schemeClr val="tx1"/>
+            </a:solidFill>
+          </a:ln>
+        </p:spPr>
+        <p:style>
+          <a:lnRef idx="2">
+            <a:schemeClr val="accent1">
+              <a:shade val="50000"/>
+            </a:schemeClr>
+          </a:lnRef>
+          <a:fillRef idx="1">
+            <a:schemeClr val="accent1"/>
+          </a:fillRef>
+          <a:effectRef idx="0">
+            <a:schemeClr val="accent1"/>
+          </a:effectRef>
+          <a:fontRef idx="minor">
+            <a:schemeClr val="lt1"/>
+          </a:fontRef>
+        </p:style>
+        <p:txBody>
+          <a:bodyPr rtlCol="0" anchor="ctr"/>
+          <a:lstStyle/>
+          <a:p>
+            <a:pPr algn="ctr"/>
+            <a:r>
+              <a:rPr lang="en-US" dirty="0" smtClean="0">
+                <a:solidFill>
+                  <a:schemeClr val="tx1"/>
+                </a:solidFill>
+              </a:rPr>
+              <a:t>Starting with _ is allowed</a:t>
+            </a:r>
+            <a:endParaRPr lang="en-US" dirty="0" smtClean="0">
+              <a:solidFill>
+                <a:schemeClr val="tx1"/>
+              </a:solidFill>
+            </a:endParaRPr>
+          </a:p>
+        </p:txBody>
+      </p:sp>
+      <p:sp>
+        <p:nvSpPr>
+          <p:cNvPr id="15" name="Rectangle 14"/>
+          <p:cNvSpPr/>
+          <p:nvPr/>
+        </p:nvSpPr>
+        <p:spPr>
+          <a:xfrm>
+            <a:off x="6095998" y="783723"/>
+            <a:ext cx="4770583" cy="546313"/>
+          </a:xfrm>
+          <a:prstGeom prst="rect">
+            <a:avLst/>
+          </a:prstGeom>
+          <a:solidFill>
+            <a:srgbClr val="FF0000"/>
+          </a:solidFill>
+          <a:ln>
+            <a:noFill/>
+          </a:ln>
+        </p:spPr>
+        <p:style>
+          <a:lnRef idx="2">
+            <a:schemeClr val="accent1">
+              <a:shade val="50000"/>
+            </a:schemeClr>
+          </a:lnRef>
+          <a:fillRef idx="1">
+            <a:schemeClr val="accent1"/>
+          </a:fillRef>
+          <a:effectRef idx="0">
+            <a:schemeClr val="accent1"/>
+          </a:effectRef>
+          <a:fontRef idx="minor">
+            <a:schemeClr val="lt1"/>
+          </a:fontRef>
+        </p:style>
+        <p:txBody>
+          <a:bodyPr rtlCol="0" anchor="ctr"/>
+          <a:lstStyle/>
+          <a:p>
+            <a:pPr algn="ctr"/>
+            <a:r>
+              <a:rPr lang="en-US" dirty="0" smtClean="0">
+                <a:latin typeface="Calibri (Corps)"/>
+                <a:cs typeface="Segoe UI Light" panose="020B0502040204020203" pitchFamily="34" charset="0"/>
+              </a:rPr>
+              <a:t>Not Allowed / Not Recommended</a:t>
+            </a:r>
+            <a:endParaRPr lang="en-US" dirty="0">
+              <a:latin typeface="Calibri (Corps)"/>
+              <a:cs typeface="Segoe UI Light" panose="020B0502040204020203" pitchFamily="34" charset="0"/>
+            </a:endParaRPr>
+          </a:p>
+        </p:txBody>
+      </p:sp>
+      <p:sp>
+        <p:nvSpPr>
+          <p:cNvPr id="16" name="Rectangle 15"/>
+          <p:cNvSpPr/>
+          <p:nvPr/>
+        </p:nvSpPr>
+        <p:spPr>
+          <a:xfrm>
+            <a:off x="6095998" y="1494922"/>
+            <a:ext cx="3015674" cy="748145"/>
+          </a:xfrm>
+          <a:prstGeom prst="rect">
+            <a:avLst/>
+          </a:prstGeom>
+          <a:solidFill>
+            <a:srgbClr val="FF5050">
+              <a:alpha val="50980"/>
+            </a:srgbClr>
+          </a:solidFill>
+          <a:ln w="28575">
+            <a:solidFill>
+              <a:srgbClr val="FF0000"/>
+            </a:solidFill>
+            <a:prstDash val="dash"/>
+          </a:ln>
+        </p:spPr>
+        <p:style>
+          <a:lnRef idx="2">
+            <a:schemeClr val="accent1">
+              <a:shade val="50000"/>
+            </a:schemeClr>
+          </a:lnRef>
+          <a:fillRef idx="1">
+            <a:schemeClr val="accent1"/>
+          </a:fillRef>
+          <a:effectRef idx="0">
+            <a:schemeClr val="accent1"/>
+          </a:effectRef>
+          <a:fontRef idx="minor">
+            <a:schemeClr val="lt1"/>
+          </a:fontRef>
+        </p:style>
+        <p:txBody>
+          <a:bodyPr rtlCol="0" anchor="ctr"/>
+          <a:lstStyle/>
+          <a:p>
+            <a:pPr algn="ctr"/>
+            <a:r>
+              <a:rPr lang="en-US" dirty="0" smtClean="0">
+                <a:solidFill>
+                  <a:srgbClr val="FF0000"/>
+                </a:solidFill>
+                <a:latin typeface="Calibri (Corps)"/>
+                <a:cs typeface="Segoe UI Light" panose="020B0502040204020203" pitchFamily="34" charset="0"/>
+              </a:rPr>
+              <a:t>Let user_name</a:t>
+            </a:r>
+            <a:endParaRPr lang="en-US" dirty="0">
+              <a:solidFill>
+                <a:srgbClr val="FF0000"/>
+              </a:solidFill>
+              <a:latin typeface="Calibri (Corps)"/>
+              <a:cs typeface="Segoe UI Light" panose="020B0502040204020203" pitchFamily="34" charset="0"/>
+            </a:endParaRPr>
+          </a:p>
+        </p:txBody>
+      </p:sp>
+      <p:sp>
+        <p:nvSpPr>
+          <p:cNvPr id="17" name="Rectangle 16"/>
+          <p:cNvSpPr/>
+          <p:nvPr/>
+        </p:nvSpPr>
+        <p:spPr>
+          <a:xfrm>
+            <a:off x="9314871" y="1494922"/>
+            <a:ext cx="1551710" cy="748145"/>
+          </a:xfrm>
+          <a:prstGeom prst="rect">
+            <a:avLst/>
+          </a:prstGeom>
+          <a:solidFill>
+            <a:srgbClr val="FFFF00"/>
+          </a:solidFill>
+          <a:ln w="28575">
+            <a:solidFill>
+              <a:schemeClr val="tx1"/>
+            </a:solidFill>
+          </a:ln>
+        </p:spPr>
+        <p:style>
+          <a:lnRef idx="2">
+            <a:schemeClr val="accent1">
+              <a:shade val="50000"/>
+            </a:schemeClr>
+          </a:lnRef>
+          <a:fillRef idx="1">
+            <a:schemeClr val="accent1"/>
+          </a:fillRef>
+          <a:effectRef idx="0">
+            <a:schemeClr val="accent1"/>
+          </a:effectRef>
+          <a:fontRef idx="minor">
+            <a:schemeClr val="lt1"/>
+          </a:fontRef>
+        </p:style>
+        <p:txBody>
+          <a:bodyPr rtlCol="0" anchor="ctr"/>
+          <a:lstStyle/>
+          <a:p>
+            <a:pPr algn="ctr"/>
+            <a:r>
+              <a:rPr lang="en-US" dirty="0" smtClean="0">
+                <a:solidFill>
+                  <a:schemeClr val="tx1"/>
+                </a:solidFill>
+              </a:rPr>
+              <a:t>Allowed but bad practice!</a:t>
+            </a:r>
+            <a:endParaRPr lang="en-US" b="1" dirty="0">
+              <a:solidFill>
+                <a:schemeClr val="tx1"/>
+              </a:solidFill>
+            </a:endParaRPr>
+          </a:p>
+        </p:txBody>
+      </p:sp>
+      <p:sp>
+        <p:nvSpPr>
+          <p:cNvPr id="18" name="Rectangle 17"/>
+          <p:cNvSpPr/>
+          <p:nvPr/>
+        </p:nvSpPr>
+        <p:spPr>
+          <a:xfrm>
+            <a:off x="6095998" y="2532131"/>
+            <a:ext cx="3015674" cy="748145"/>
+          </a:xfrm>
+          <a:prstGeom prst="rect">
+            <a:avLst/>
+          </a:prstGeom>
+          <a:solidFill>
+            <a:srgbClr val="FF5050">
+              <a:alpha val="50980"/>
+            </a:srgbClr>
+          </a:solidFill>
+          <a:ln w="28575">
+            <a:solidFill>
+              <a:srgbClr val="FF0000"/>
+            </a:solidFill>
+            <a:prstDash val="dash"/>
+          </a:ln>
+        </p:spPr>
+        <p:style>
+          <a:lnRef idx="2">
+            <a:schemeClr val="accent1">
+              <a:shade val="50000"/>
+            </a:schemeClr>
+          </a:lnRef>
+          <a:fillRef idx="1">
+            <a:schemeClr val="accent1"/>
+          </a:fillRef>
+          <a:effectRef idx="0">
+            <a:schemeClr val="accent1"/>
+          </a:effectRef>
+          <a:fontRef idx="minor">
+            <a:schemeClr val="lt1"/>
+          </a:fontRef>
+        </p:style>
+        <p:txBody>
+          <a:bodyPr rtlCol="0" anchor="ctr"/>
+          <a:lstStyle/>
+          <a:p>
+            <a:pPr algn="ctr"/>
+            <a:r>
+              <a:rPr lang="en-US" dirty="0" smtClean="0">
+                <a:solidFill>
+                  <a:srgbClr val="FF0000"/>
+                </a:solidFill>
+                <a:latin typeface="Calibri (Corps)"/>
+                <a:cs typeface="Segoe UI Light" panose="020B0502040204020203" pitchFamily="34" charset="0"/>
+              </a:rPr>
+              <a:t>Let 21Players</a:t>
+            </a:r>
+            <a:endParaRPr lang="en-US" dirty="0">
+              <a:solidFill>
+                <a:srgbClr val="FF0000"/>
+              </a:solidFill>
+              <a:latin typeface="Calibri (Corps)"/>
+              <a:cs typeface="Segoe UI Light" panose="020B0502040204020203" pitchFamily="34" charset="0"/>
+            </a:endParaRPr>
+          </a:p>
+        </p:txBody>
+      </p:sp>
+      <p:sp>
+        <p:nvSpPr>
+          <p:cNvPr id="19" name="Rectangle 18"/>
+          <p:cNvSpPr/>
+          <p:nvPr/>
+        </p:nvSpPr>
+        <p:spPr>
+          <a:xfrm>
+            <a:off x="9314871" y="2539742"/>
+            <a:ext cx="1551710" cy="748145"/>
+          </a:xfrm>
+          <a:prstGeom prst="rect">
+            <a:avLst/>
+          </a:prstGeom>
+          <a:solidFill>
+            <a:srgbClr val="FFFF00"/>
+          </a:solidFill>
+          <a:ln w="28575">
+            <a:solidFill>
+              <a:schemeClr val="tx1"/>
+            </a:solidFill>
+          </a:ln>
+        </p:spPr>
+        <p:style>
+          <a:lnRef idx="2">
+            <a:schemeClr val="accent1">
+              <a:shade val="50000"/>
+            </a:schemeClr>
+          </a:lnRef>
+          <a:fillRef idx="1">
+            <a:schemeClr val="accent1"/>
+          </a:fillRef>
+          <a:effectRef idx="0">
+            <a:schemeClr val="accent1"/>
+          </a:effectRef>
+          <a:fontRef idx="minor">
+            <a:schemeClr val="lt1"/>
+          </a:fontRef>
+        </p:style>
+        <p:txBody>
+          <a:bodyPr rtlCol="0" anchor="ctr"/>
+          <a:lstStyle/>
+          <a:p>
+            <a:pPr algn="ctr"/>
+            <a:r>
+              <a:rPr lang="en-US" dirty="0" smtClean="0">
+                <a:solidFill>
+                  <a:schemeClr val="tx1"/>
+                </a:solidFill>
+              </a:rPr>
+              <a:t>Starting digits not allowed</a:t>
+            </a:r>
+            <a:endParaRPr lang="en-US" dirty="0" smtClean="0">
+              <a:solidFill>
+                <a:schemeClr val="tx1"/>
+              </a:solidFill>
+            </a:endParaRPr>
+          </a:p>
+        </p:txBody>
+      </p:sp>
+      <p:sp>
+        <p:nvSpPr>
+          <p:cNvPr id="20" name="Rectangle 19"/>
+          <p:cNvSpPr/>
+          <p:nvPr/>
+        </p:nvSpPr>
+        <p:spPr>
+          <a:xfrm>
+            <a:off x="6095998" y="3534279"/>
+            <a:ext cx="3015674" cy="748145"/>
+          </a:xfrm>
+          <a:prstGeom prst="rect">
+            <a:avLst/>
+          </a:prstGeom>
+          <a:solidFill>
+            <a:srgbClr val="FF5050">
+              <a:alpha val="50980"/>
+            </a:srgbClr>
+          </a:solidFill>
+          <a:ln w="28575">
+            <a:solidFill>
+              <a:srgbClr val="FF0000"/>
+            </a:solidFill>
+            <a:prstDash val="dash"/>
+          </a:ln>
+        </p:spPr>
+        <p:style>
+          <a:lnRef idx="2">
+            <a:schemeClr val="accent1">
+              <a:shade val="50000"/>
+            </a:schemeClr>
+          </a:lnRef>
+          <a:fillRef idx="1">
+            <a:schemeClr val="accent1"/>
+          </a:fillRef>
+          <a:effectRef idx="0">
+            <a:schemeClr val="accent1"/>
+          </a:effectRef>
+          <a:fontRef idx="minor">
+            <a:schemeClr val="lt1"/>
+          </a:fontRef>
+        </p:style>
+        <p:txBody>
+          <a:bodyPr rtlCol="0" anchor="ctr"/>
+          <a:lstStyle/>
+          <a:p>
+            <a:pPr algn="ctr"/>
+            <a:r>
+              <a:rPr lang="en-US" dirty="0" smtClean="0">
+                <a:solidFill>
+                  <a:srgbClr val="FF0000"/>
+                </a:solidFill>
+                <a:latin typeface="Calibri (Corps)"/>
+                <a:cs typeface="Segoe UI Light" panose="020B0502040204020203" pitchFamily="34" charset="0"/>
+              </a:rPr>
+              <a:t>Let user-b</a:t>
+            </a:r>
+            <a:endParaRPr lang="en-US" dirty="0">
+              <a:solidFill>
+                <a:srgbClr val="FF0000"/>
+              </a:solidFill>
+              <a:latin typeface="Calibri (Corps)"/>
+              <a:cs typeface="Segoe UI Light" panose="020B0502040204020203" pitchFamily="34" charset="0"/>
+            </a:endParaRPr>
+          </a:p>
+        </p:txBody>
+      </p:sp>
+      <p:sp>
+        <p:nvSpPr>
+          <p:cNvPr id="21" name="Rectangle 20"/>
+          <p:cNvSpPr/>
+          <p:nvPr/>
+        </p:nvSpPr>
+        <p:spPr>
+          <a:xfrm>
+            <a:off x="9314871" y="3525896"/>
+            <a:ext cx="1551710" cy="748145"/>
+          </a:xfrm>
+          <a:prstGeom prst="rect">
+            <a:avLst/>
+          </a:prstGeom>
+          <a:solidFill>
+            <a:srgbClr val="FFFF00"/>
+          </a:solidFill>
+          <a:ln w="28575">
+            <a:solidFill>
+              <a:schemeClr val="tx1"/>
+            </a:solidFill>
+          </a:ln>
+        </p:spPr>
+        <p:style>
+          <a:lnRef idx="2">
+            <a:schemeClr val="accent1">
+              <a:shade val="50000"/>
+            </a:schemeClr>
+          </a:lnRef>
+          <a:fillRef idx="1">
+            <a:schemeClr val="accent1"/>
+          </a:fillRef>
+          <a:effectRef idx="0">
+            <a:schemeClr val="accent1"/>
+          </a:effectRef>
+          <a:fontRef idx="minor">
+            <a:schemeClr val="lt1"/>
+          </a:fontRef>
+        </p:style>
+        <p:txBody>
+          <a:bodyPr rtlCol="0" anchor="ctr"/>
+          <a:lstStyle/>
+          <a:p>
+            <a:pPr algn="ctr"/>
+            <a:r>
+              <a:rPr lang="en-US" dirty="0" smtClean="0">
+                <a:solidFill>
+                  <a:schemeClr val="tx1"/>
+                </a:solidFill>
+              </a:rPr>
+              <a:t>No special characters!</a:t>
+            </a:r>
+            <a:endParaRPr lang="en-US" dirty="0" smtClean="0">
+              <a:solidFill>
+                <a:schemeClr val="tx1"/>
+              </a:solidFill>
+            </a:endParaRPr>
+          </a:p>
+        </p:txBody>
+      </p:sp>
+      <p:sp>
+        <p:nvSpPr>
+          <p:cNvPr id="22" name="Rectangle 21"/>
+          <p:cNvSpPr/>
+          <p:nvPr/>
+        </p:nvSpPr>
+        <p:spPr>
+          <a:xfrm>
+            <a:off x="6095998" y="4536427"/>
+            <a:ext cx="3015674" cy="748145"/>
+          </a:xfrm>
+          <a:prstGeom prst="rect">
+            <a:avLst/>
+          </a:prstGeom>
+          <a:solidFill>
+            <a:srgbClr val="FF5050">
+              <a:alpha val="50980"/>
+            </a:srgbClr>
+          </a:solidFill>
+          <a:ln w="28575">
+            <a:solidFill>
+              <a:srgbClr val="FF0000"/>
+            </a:solidFill>
+            <a:prstDash val="dash"/>
+          </a:ln>
+        </p:spPr>
+        <p:style>
+          <a:lnRef idx="2">
+            <a:schemeClr val="accent1">
+              <a:shade val="50000"/>
+            </a:schemeClr>
+          </a:lnRef>
+          <a:fillRef idx="1">
+            <a:schemeClr val="accent1"/>
+          </a:fillRef>
+          <a:effectRef idx="0">
+            <a:schemeClr val="accent1"/>
+          </a:effectRef>
+          <a:fontRef idx="minor">
+            <a:schemeClr val="lt1"/>
+          </a:fontRef>
+        </p:style>
+        <p:txBody>
+          <a:bodyPr rtlCol="0" anchor="ctr"/>
+          <a:lstStyle/>
+          <a:p>
+            <a:pPr algn="ctr"/>
+            <a:r>
+              <a:rPr lang="en-US" dirty="0" smtClean="0">
+                <a:solidFill>
+                  <a:srgbClr val="FF0000"/>
+                </a:solidFill>
+                <a:latin typeface="Calibri (Corps)"/>
+                <a:cs typeface="Segoe UI Light" panose="020B0502040204020203" pitchFamily="34" charset="0"/>
+              </a:rPr>
+              <a:t>Let </a:t>
+            </a:r>
+            <a:r>
+              <a:rPr lang="en-US" dirty="0" smtClean="0">
+                <a:solidFill>
+                  <a:srgbClr val="FF0000"/>
+                </a:solidFill>
+                <a:latin typeface="Calibri (Corps)"/>
+                <a:cs typeface="Segoe UI Light" panose="020B0502040204020203" pitchFamily="34" charset="0"/>
+              </a:rPr>
+              <a:t>let</a:t>
+            </a:r>
+            <a:endParaRPr lang="en-US" dirty="0">
+              <a:solidFill>
+                <a:srgbClr val="FF0000"/>
+              </a:solidFill>
+              <a:latin typeface="Calibri (Corps)"/>
+              <a:cs typeface="Segoe UI Light" panose="020B0502040204020203" pitchFamily="34" charset="0"/>
+            </a:endParaRPr>
+          </a:p>
+        </p:txBody>
+      </p:sp>
+      <p:sp>
+        <p:nvSpPr>
+          <p:cNvPr id="23" name="Rectangle 22"/>
+          <p:cNvSpPr/>
+          <p:nvPr/>
+        </p:nvSpPr>
+        <p:spPr>
+          <a:xfrm>
+            <a:off x="9314871" y="4536426"/>
+            <a:ext cx="1551710" cy="748145"/>
+          </a:xfrm>
+          <a:prstGeom prst="rect">
+            <a:avLst/>
+          </a:prstGeom>
+          <a:solidFill>
+            <a:srgbClr val="FFFF00"/>
+          </a:solidFill>
+          <a:ln w="28575">
+            <a:solidFill>
+              <a:schemeClr val="tx1"/>
+            </a:solidFill>
+          </a:ln>
+        </p:spPr>
+        <p:style>
+          <a:lnRef idx="2">
+            <a:schemeClr val="accent1">
+              <a:shade val="50000"/>
+            </a:schemeClr>
+          </a:lnRef>
+          <a:fillRef idx="1">
+            <a:schemeClr val="accent1"/>
+          </a:fillRef>
+          <a:effectRef idx="0">
+            <a:schemeClr val="accent1"/>
+          </a:effectRef>
+          <a:fontRef idx="minor">
+            <a:schemeClr val="lt1"/>
+          </a:fontRef>
+        </p:style>
+        <p:txBody>
+          <a:bodyPr rtlCol="0" anchor="ctr"/>
+          <a:lstStyle/>
+          <a:p>
+            <a:pPr algn="ctr"/>
+            <a:r>
+              <a:rPr lang="en-US" dirty="0" smtClean="0">
+                <a:solidFill>
+                  <a:schemeClr val="tx1"/>
+                </a:solidFill>
+              </a:rPr>
+              <a:t>Keywords not allowed</a:t>
+            </a:r>
+            <a:endParaRPr lang="en-US" dirty="0" smtClean="0">
+              <a:solidFill>
+                <a:schemeClr val="tx1"/>
+              </a:solidFill>
+            </a:endParaRPr>
+          </a:p>
+        </p:txBody>
+      </p:sp>
+    </p:spTree>
+    <p:extLst>
+      <p:ext uri="{BB962C8B-B14F-4D97-AF65-F5344CB8AC3E}">
+        <p14:creationId xmlns:p14="http://schemas.microsoft.com/office/powerpoint/2010/main" val="2843985020"/>
       </p:ext>
     </p:extLst>
   </p:cSld>

</xml_diff>

<commit_message>
7. Working with Variables & Operators
</commit_message>
<xml_diff>
--- a/2. Basics Variables, Data Types, Operators & Functions/docs/Introduction.pptx
+++ b/2. Basics Variables, Data Types, Operators & Functions/docs/Introduction.pptx
@@ -9,6 +9,7 @@
     <p:sldId id="257" r:id="rId3"/>
     <p:sldId id="258" r:id="rId4"/>
     <p:sldId id="259" r:id="rId5"/>
+    <p:sldId id="261" r:id="rId6"/>
   </p:sldIdLst>
   <p:sldSz cx="12192000" cy="6858000"/>
   <p:notesSz cx="6858000" cy="9144000"/>
@@ -4636,11 +4637,6 @@
               </a:rPr>
               <a:t>Only letters and digits</a:t>
             </a:r>
-            <a:endParaRPr lang="en-US" dirty="0" smtClean="0">
-              <a:solidFill>
-                <a:schemeClr val="tx1"/>
-              </a:solidFill>
-            </a:endParaRPr>
           </a:p>
         </p:txBody>
       </p:sp>
@@ -4769,11 +4765,6 @@
               </a:rPr>
               <a:t>Starting with $ is allowed</a:t>
             </a:r>
-            <a:endParaRPr lang="en-US" dirty="0" smtClean="0">
-              <a:solidFill>
-                <a:schemeClr val="tx1"/>
-              </a:solidFill>
-            </a:endParaRPr>
           </a:p>
         </p:txBody>
       </p:sp>
@@ -4902,11 +4893,6 @@
               </a:rPr>
               <a:t>Starting with _ is allowed</a:t>
             </a:r>
-            <a:endParaRPr lang="en-US" dirty="0" smtClean="0">
-              <a:solidFill>
-                <a:schemeClr val="tx1"/>
-              </a:solidFill>
-            </a:endParaRPr>
           </a:p>
         </p:txBody>
       </p:sp>
@@ -5212,11 +5198,6 @@
               </a:rPr>
               <a:t>Starting digits not allowed</a:t>
             </a:r>
-            <a:endParaRPr lang="en-US" dirty="0" smtClean="0">
-              <a:solidFill>
-                <a:schemeClr val="tx1"/>
-              </a:solidFill>
-            </a:endParaRPr>
           </a:p>
         </p:txBody>
       </p:sp>
@@ -5339,11 +5320,6 @@
               </a:rPr>
               <a:t>No special characters!</a:t>
             </a:r>
-            <a:endParaRPr lang="en-US" dirty="0" smtClean="0">
-              <a:solidFill>
-                <a:schemeClr val="tx1"/>
-              </a:solidFill>
-            </a:endParaRPr>
           </a:p>
         </p:txBody>
       </p:sp>
@@ -5402,17 +5378,7 @@
                 <a:latin typeface="Calibri (Corps)"/>
                 <a:cs typeface="Segoe UI Light" panose="020B0502040204020203" pitchFamily="34" charset="0"/>
               </a:rPr>
-              <a:t>Let </a:t>
-            </a:r>
-            <a:r>
-              <a:rPr lang="en-US" dirty="0" smtClean="0">
-                <a:solidFill>
-                  <a:srgbClr val="FF0000"/>
-                </a:solidFill>
-                <a:latin typeface="Calibri (Corps)"/>
-                <a:cs typeface="Segoe UI Light" panose="020B0502040204020203" pitchFamily="34" charset="0"/>
-              </a:rPr>
-              <a:t>let</a:t>
+              <a:t>Let let</a:t>
             </a:r>
             <a:endParaRPr lang="en-US" dirty="0">
               <a:solidFill>
@@ -5476,11 +5442,6 @@
               </a:rPr>
               <a:t>Keywords not allowed</a:t>
             </a:r>
-            <a:endParaRPr lang="en-US" dirty="0" smtClean="0">
-              <a:solidFill>
-                <a:schemeClr val="tx1"/>
-              </a:solidFill>
-            </a:endParaRPr>
           </a:p>
         </p:txBody>
       </p:sp>
@@ -5488,6 +5449,923 @@
     <p:extLst>
       <p:ext uri="{BB962C8B-B14F-4D97-AF65-F5344CB8AC3E}">
         <p14:creationId xmlns:p14="http://schemas.microsoft.com/office/powerpoint/2010/main" val="2843985020"/>
+      </p:ext>
+    </p:extLst>
+  </p:cSld>
+  <p:clrMapOvr>
+    <a:masterClrMapping/>
+  </p:clrMapOvr>
+</p:sld>
+</file>
+
+<file path=ppt/slides/slide5.xml><?xml version="1.0" encoding="utf-8"?>
+<p:sld xmlns:a="http://schemas.openxmlformats.org/drawingml/2006/main" xmlns:r="http://schemas.openxmlformats.org/officeDocument/2006/relationships" xmlns:p="http://schemas.openxmlformats.org/presentationml/2006/main">
+  <p:cSld>
+    <p:spTree>
+      <p:nvGrpSpPr>
+        <p:cNvPr id="1" name=""/>
+        <p:cNvGrpSpPr/>
+        <p:nvPr/>
+      </p:nvGrpSpPr>
+      <p:grpSpPr>
+        <a:xfrm>
+          <a:off x="0" y="0"/>
+          <a:ext cx="0" cy="0"/>
+          <a:chOff x="0" y="0"/>
+          <a:chExt cx="0" cy="0"/>
+        </a:xfrm>
+      </p:grpSpPr>
+      <p:sp>
+        <p:nvSpPr>
+          <p:cNvPr id="2" name="Rectangle 1"/>
+          <p:cNvSpPr/>
+          <p:nvPr/>
+        </p:nvSpPr>
+        <p:spPr>
+          <a:xfrm>
+            <a:off x="572654" y="1043709"/>
+            <a:ext cx="609600" cy="591128"/>
+          </a:xfrm>
+          <a:prstGeom prst="rect">
+            <a:avLst/>
+          </a:prstGeom>
+          <a:solidFill>
+            <a:srgbClr val="660066"/>
+          </a:solidFill>
+          <a:ln w="28575">
+            <a:solidFill>
+              <a:srgbClr val="660066"/>
+            </a:solidFill>
+          </a:ln>
+        </p:spPr>
+        <p:style>
+          <a:lnRef idx="2">
+            <a:schemeClr val="accent1">
+              <a:shade val="50000"/>
+            </a:schemeClr>
+          </a:lnRef>
+          <a:fillRef idx="1">
+            <a:schemeClr val="accent1"/>
+          </a:fillRef>
+          <a:effectRef idx="0">
+            <a:schemeClr val="accent1"/>
+          </a:effectRef>
+          <a:fontRef idx="minor">
+            <a:schemeClr val="lt1"/>
+          </a:fontRef>
+        </p:style>
+        <p:txBody>
+          <a:bodyPr rtlCol="0" anchor="ctr"/>
+          <a:lstStyle/>
+          <a:p>
+            <a:pPr algn="ctr"/>
+            <a:r>
+              <a:rPr lang="en-US" dirty="0" smtClean="0">
+                <a:latin typeface="Calibri (Corps)"/>
+                <a:cs typeface="Segoe UI Light" panose="020B0502040204020203" pitchFamily="34" charset="0"/>
+              </a:rPr>
+              <a:t>+</a:t>
+            </a:r>
+            <a:endParaRPr lang="en-US" dirty="0">
+              <a:latin typeface="Calibri (Corps)"/>
+              <a:cs typeface="Segoe UI Light" panose="020B0502040204020203" pitchFamily="34" charset="0"/>
+            </a:endParaRPr>
+          </a:p>
+        </p:txBody>
+      </p:sp>
+      <p:sp>
+        <p:nvSpPr>
+          <p:cNvPr id="3" name="ZoneTexte 2"/>
+          <p:cNvSpPr txBox="1"/>
+          <p:nvPr/>
+        </p:nvSpPr>
+        <p:spPr>
+          <a:xfrm>
+            <a:off x="489527" y="193964"/>
+            <a:ext cx="4368799" cy="523220"/>
+          </a:xfrm>
+          <a:prstGeom prst="rect">
+            <a:avLst/>
+          </a:prstGeom>
+          <a:noFill/>
+        </p:spPr>
+        <p:txBody>
+          <a:bodyPr wrap="square" rtlCol="0">
+            <a:spAutoFit/>
+          </a:bodyPr>
+          <a:lstStyle/>
+          <a:p>
+            <a:r>
+              <a:rPr lang="en-US" sz="2800" b="1" dirty="0" smtClean="0">
+                <a:ea typeface="Segoe UI Black" panose="020B0A02040204020203" pitchFamily="34" charset="0"/>
+                <a:cs typeface="Segoe UI Semibold" panose="020B0702040204020203" pitchFamily="34" charset="0"/>
+              </a:rPr>
+              <a:t>Operators</a:t>
+            </a:r>
+            <a:endParaRPr lang="en-US" sz="2800" b="1" dirty="0">
+              <a:ea typeface="Segoe UI Black" panose="020B0A02040204020203" pitchFamily="34" charset="0"/>
+              <a:cs typeface="Segoe UI Semibold" panose="020B0702040204020203" pitchFamily="34" charset="0"/>
+            </a:endParaRPr>
+          </a:p>
+        </p:txBody>
+      </p:sp>
+      <p:sp>
+        <p:nvSpPr>
+          <p:cNvPr id="7" name="Rectangle 6"/>
+          <p:cNvSpPr/>
+          <p:nvPr/>
+        </p:nvSpPr>
+        <p:spPr>
+          <a:xfrm>
+            <a:off x="1496289" y="1051583"/>
+            <a:ext cx="4322620" cy="583256"/>
+          </a:xfrm>
+          <a:prstGeom prst="rect">
+            <a:avLst/>
+          </a:prstGeom>
+          <a:solidFill>
+            <a:srgbClr val="CC3399">
+              <a:alpha val="29020"/>
+            </a:srgbClr>
+          </a:solidFill>
+          <a:ln w="28575">
+            <a:solidFill>
+              <a:srgbClr val="7030A0"/>
+            </a:solidFill>
+          </a:ln>
+        </p:spPr>
+        <p:style>
+          <a:lnRef idx="2">
+            <a:schemeClr val="accent1">
+              <a:shade val="50000"/>
+            </a:schemeClr>
+          </a:lnRef>
+          <a:fillRef idx="1">
+            <a:schemeClr val="accent1"/>
+          </a:fillRef>
+          <a:effectRef idx="0">
+            <a:schemeClr val="accent1"/>
+          </a:effectRef>
+          <a:fontRef idx="minor">
+            <a:schemeClr val="lt1"/>
+          </a:fontRef>
+        </p:style>
+        <p:txBody>
+          <a:bodyPr rtlCol="0" anchor="ctr"/>
+          <a:lstStyle/>
+          <a:p>
+            <a:pPr algn="ctr"/>
+            <a:r>
+              <a:rPr lang="en-US" dirty="0" smtClean="0">
+                <a:solidFill>
+                  <a:srgbClr val="7030A0"/>
+                </a:solidFill>
+                <a:latin typeface="Calibri (Corps)"/>
+                <a:cs typeface="Segoe UI Light" panose="020B0502040204020203" pitchFamily="34" charset="0"/>
+              </a:rPr>
+              <a:t>Add two numbers</a:t>
+            </a:r>
+            <a:endParaRPr lang="en-US" dirty="0">
+              <a:solidFill>
+                <a:srgbClr val="7030A0"/>
+              </a:solidFill>
+              <a:latin typeface="Calibri (Corps)"/>
+              <a:cs typeface="Segoe UI Light" panose="020B0502040204020203" pitchFamily="34" charset="0"/>
+            </a:endParaRPr>
+          </a:p>
+        </p:txBody>
+      </p:sp>
+      <p:sp>
+        <p:nvSpPr>
+          <p:cNvPr id="9" name="Rectangle 8"/>
+          <p:cNvSpPr/>
+          <p:nvPr/>
+        </p:nvSpPr>
+        <p:spPr>
+          <a:xfrm>
+            <a:off x="1496289" y="1878237"/>
+            <a:ext cx="4322620" cy="591128"/>
+          </a:xfrm>
+          <a:prstGeom prst="rect">
+            <a:avLst/>
+          </a:prstGeom>
+          <a:solidFill>
+            <a:srgbClr val="CC3399">
+              <a:alpha val="29020"/>
+            </a:srgbClr>
+          </a:solidFill>
+          <a:ln w="28575">
+            <a:solidFill>
+              <a:srgbClr val="7030A0"/>
+            </a:solidFill>
+          </a:ln>
+        </p:spPr>
+        <p:style>
+          <a:lnRef idx="2">
+            <a:schemeClr val="accent1">
+              <a:shade val="50000"/>
+            </a:schemeClr>
+          </a:lnRef>
+          <a:fillRef idx="1">
+            <a:schemeClr val="accent1"/>
+          </a:fillRef>
+          <a:effectRef idx="0">
+            <a:schemeClr val="accent1"/>
+          </a:effectRef>
+          <a:fontRef idx="minor">
+            <a:schemeClr val="lt1"/>
+          </a:fontRef>
+        </p:style>
+        <p:txBody>
+          <a:bodyPr rtlCol="0" anchor="ctr"/>
+          <a:lstStyle/>
+          <a:p>
+            <a:pPr algn="ctr"/>
+            <a:r>
+              <a:rPr lang="en-US" dirty="0" smtClean="0">
+                <a:solidFill>
+                  <a:srgbClr val="7030A0"/>
+                </a:solidFill>
+                <a:latin typeface="Calibri (Corps)"/>
+                <a:cs typeface="Segoe UI Light" panose="020B0502040204020203" pitchFamily="34" charset="0"/>
+              </a:rPr>
+              <a:t>Subtract two numbers</a:t>
+            </a:r>
+            <a:endParaRPr lang="en-US" dirty="0">
+              <a:solidFill>
+                <a:srgbClr val="7030A0"/>
+              </a:solidFill>
+              <a:latin typeface="Calibri (Corps)"/>
+              <a:cs typeface="Segoe UI Light" panose="020B0502040204020203" pitchFamily="34" charset="0"/>
+            </a:endParaRPr>
+          </a:p>
+        </p:txBody>
+      </p:sp>
+      <p:sp>
+        <p:nvSpPr>
+          <p:cNvPr id="13" name="Rectangle 12"/>
+          <p:cNvSpPr/>
+          <p:nvPr/>
+        </p:nvSpPr>
+        <p:spPr>
+          <a:xfrm>
+            <a:off x="572654" y="1878237"/>
+            <a:ext cx="609600" cy="591128"/>
+          </a:xfrm>
+          <a:prstGeom prst="rect">
+            <a:avLst/>
+          </a:prstGeom>
+          <a:solidFill>
+            <a:srgbClr val="660066"/>
+          </a:solidFill>
+          <a:ln w="28575">
+            <a:solidFill>
+              <a:srgbClr val="660066"/>
+            </a:solidFill>
+          </a:ln>
+        </p:spPr>
+        <p:style>
+          <a:lnRef idx="2">
+            <a:schemeClr val="accent1">
+              <a:shade val="50000"/>
+            </a:schemeClr>
+          </a:lnRef>
+          <a:fillRef idx="1">
+            <a:schemeClr val="accent1"/>
+          </a:fillRef>
+          <a:effectRef idx="0">
+            <a:schemeClr val="accent1"/>
+          </a:effectRef>
+          <a:fontRef idx="minor">
+            <a:schemeClr val="lt1"/>
+          </a:fontRef>
+        </p:style>
+        <p:txBody>
+          <a:bodyPr rtlCol="0" anchor="ctr"/>
+          <a:lstStyle/>
+          <a:p>
+            <a:pPr algn="ctr"/>
+            <a:r>
+              <a:rPr lang="en-US" dirty="0" smtClean="0">
+                <a:latin typeface="Calibri (Corps)"/>
+                <a:cs typeface="Segoe UI Light" panose="020B0502040204020203" pitchFamily="34" charset="0"/>
+              </a:rPr>
+              <a:t>-</a:t>
+            </a:r>
+            <a:endParaRPr lang="en-US" dirty="0">
+              <a:latin typeface="Calibri (Corps)"/>
+              <a:cs typeface="Segoe UI Light" panose="020B0502040204020203" pitchFamily="34" charset="0"/>
+            </a:endParaRPr>
+          </a:p>
+        </p:txBody>
+      </p:sp>
+      <p:sp>
+        <p:nvSpPr>
+          <p:cNvPr id="20" name="Rectangle 19"/>
+          <p:cNvSpPr/>
+          <p:nvPr/>
+        </p:nvSpPr>
+        <p:spPr>
+          <a:xfrm>
+            <a:off x="572654" y="2712762"/>
+            <a:ext cx="609600" cy="591128"/>
+          </a:xfrm>
+          <a:prstGeom prst="rect">
+            <a:avLst/>
+          </a:prstGeom>
+          <a:solidFill>
+            <a:srgbClr val="660066"/>
+          </a:solidFill>
+          <a:ln w="28575">
+            <a:solidFill>
+              <a:srgbClr val="660066"/>
+            </a:solidFill>
+          </a:ln>
+        </p:spPr>
+        <p:style>
+          <a:lnRef idx="2">
+            <a:schemeClr val="accent1">
+              <a:shade val="50000"/>
+            </a:schemeClr>
+          </a:lnRef>
+          <a:fillRef idx="1">
+            <a:schemeClr val="accent1"/>
+          </a:fillRef>
+          <a:effectRef idx="0">
+            <a:schemeClr val="accent1"/>
+          </a:effectRef>
+          <a:fontRef idx="minor">
+            <a:schemeClr val="lt1"/>
+          </a:fontRef>
+        </p:style>
+        <p:txBody>
+          <a:bodyPr rtlCol="0" anchor="ctr"/>
+          <a:lstStyle/>
+          <a:p>
+            <a:pPr algn="ctr"/>
+            <a:r>
+              <a:rPr lang="en-US" dirty="0" smtClean="0">
+                <a:latin typeface="Calibri (Corps)"/>
+                <a:cs typeface="Segoe UI Light" panose="020B0502040204020203" pitchFamily="34" charset="0"/>
+              </a:rPr>
+              <a:t>*</a:t>
+            </a:r>
+            <a:endParaRPr lang="en-US" dirty="0">
+              <a:latin typeface="Calibri (Corps)"/>
+              <a:cs typeface="Segoe UI Light" panose="020B0502040204020203" pitchFamily="34" charset="0"/>
+            </a:endParaRPr>
+          </a:p>
+        </p:txBody>
+      </p:sp>
+      <p:sp>
+        <p:nvSpPr>
+          <p:cNvPr id="21" name="Rectangle 20"/>
+          <p:cNvSpPr/>
+          <p:nvPr/>
+        </p:nvSpPr>
+        <p:spPr>
+          <a:xfrm>
+            <a:off x="572654" y="3599977"/>
+            <a:ext cx="609600" cy="591128"/>
+          </a:xfrm>
+          <a:prstGeom prst="rect">
+            <a:avLst/>
+          </a:prstGeom>
+          <a:solidFill>
+            <a:srgbClr val="660066"/>
+          </a:solidFill>
+          <a:ln w="28575">
+            <a:solidFill>
+              <a:srgbClr val="660066"/>
+            </a:solidFill>
+          </a:ln>
+        </p:spPr>
+        <p:style>
+          <a:lnRef idx="2">
+            <a:schemeClr val="accent1">
+              <a:shade val="50000"/>
+            </a:schemeClr>
+          </a:lnRef>
+          <a:fillRef idx="1">
+            <a:schemeClr val="accent1"/>
+          </a:fillRef>
+          <a:effectRef idx="0">
+            <a:schemeClr val="accent1"/>
+          </a:effectRef>
+          <a:fontRef idx="minor">
+            <a:schemeClr val="lt1"/>
+          </a:fontRef>
+        </p:style>
+        <p:txBody>
+          <a:bodyPr rtlCol="0" anchor="ctr"/>
+          <a:lstStyle/>
+          <a:p>
+            <a:pPr algn="ctr"/>
+            <a:r>
+              <a:rPr lang="en-US" dirty="0" smtClean="0">
+                <a:latin typeface="Calibri (Corps)"/>
+                <a:cs typeface="Segoe UI Light" panose="020B0502040204020203" pitchFamily="34" charset="0"/>
+              </a:rPr>
+              <a:t>/</a:t>
+            </a:r>
+            <a:endParaRPr lang="en-US" dirty="0">
+              <a:latin typeface="Calibri (Corps)"/>
+              <a:cs typeface="Segoe UI Light" panose="020B0502040204020203" pitchFamily="34" charset="0"/>
+            </a:endParaRPr>
+          </a:p>
+        </p:txBody>
+      </p:sp>
+      <p:sp>
+        <p:nvSpPr>
+          <p:cNvPr id="22" name="Rectangle 21"/>
+          <p:cNvSpPr/>
+          <p:nvPr/>
+        </p:nvSpPr>
+        <p:spPr>
+          <a:xfrm>
+            <a:off x="1496289" y="2712762"/>
+            <a:ext cx="4322620" cy="591128"/>
+          </a:xfrm>
+          <a:prstGeom prst="rect">
+            <a:avLst/>
+          </a:prstGeom>
+          <a:solidFill>
+            <a:srgbClr val="CC3399">
+              <a:alpha val="29020"/>
+            </a:srgbClr>
+          </a:solidFill>
+          <a:ln w="28575">
+            <a:solidFill>
+              <a:srgbClr val="7030A0"/>
+            </a:solidFill>
+          </a:ln>
+        </p:spPr>
+        <p:style>
+          <a:lnRef idx="2">
+            <a:schemeClr val="accent1">
+              <a:shade val="50000"/>
+            </a:schemeClr>
+          </a:lnRef>
+          <a:fillRef idx="1">
+            <a:schemeClr val="accent1"/>
+          </a:fillRef>
+          <a:effectRef idx="0">
+            <a:schemeClr val="accent1"/>
+          </a:effectRef>
+          <a:fontRef idx="minor">
+            <a:schemeClr val="lt1"/>
+          </a:fontRef>
+        </p:style>
+        <p:txBody>
+          <a:bodyPr rtlCol="0" anchor="ctr"/>
+          <a:lstStyle/>
+          <a:p>
+            <a:pPr algn="ctr"/>
+            <a:r>
+              <a:rPr lang="en-US" dirty="0" smtClean="0">
+                <a:solidFill>
+                  <a:srgbClr val="7030A0"/>
+                </a:solidFill>
+                <a:latin typeface="Calibri (Corps)"/>
+                <a:cs typeface="Segoe UI Light" panose="020B0502040204020203" pitchFamily="34" charset="0"/>
+              </a:rPr>
+              <a:t>Multiply two numbers</a:t>
+            </a:r>
+            <a:endParaRPr lang="en-US" dirty="0">
+              <a:solidFill>
+                <a:srgbClr val="7030A0"/>
+              </a:solidFill>
+              <a:latin typeface="Calibri (Corps)"/>
+              <a:cs typeface="Segoe UI Light" panose="020B0502040204020203" pitchFamily="34" charset="0"/>
+            </a:endParaRPr>
+          </a:p>
+        </p:txBody>
+      </p:sp>
+      <p:sp>
+        <p:nvSpPr>
+          <p:cNvPr id="23" name="Rectangle 22"/>
+          <p:cNvSpPr/>
+          <p:nvPr/>
+        </p:nvSpPr>
+        <p:spPr>
+          <a:xfrm>
+            <a:off x="1496289" y="3599977"/>
+            <a:ext cx="4322620" cy="591128"/>
+          </a:xfrm>
+          <a:prstGeom prst="rect">
+            <a:avLst/>
+          </a:prstGeom>
+          <a:solidFill>
+            <a:srgbClr val="CC3399">
+              <a:alpha val="29020"/>
+            </a:srgbClr>
+          </a:solidFill>
+          <a:ln w="28575">
+            <a:solidFill>
+              <a:srgbClr val="7030A0"/>
+            </a:solidFill>
+          </a:ln>
+        </p:spPr>
+        <p:style>
+          <a:lnRef idx="2">
+            <a:schemeClr val="accent1">
+              <a:shade val="50000"/>
+            </a:schemeClr>
+          </a:lnRef>
+          <a:fillRef idx="1">
+            <a:schemeClr val="accent1"/>
+          </a:fillRef>
+          <a:effectRef idx="0">
+            <a:schemeClr val="accent1"/>
+          </a:effectRef>
+          <a:fontRef idx="minor">
+            <a:schemeClr val="lt1"/>
+          </a:fontRef>
+        </p:style>
+        <p:txBody>
+          <a:bodyPr rtlCol="0" anchor="ctr"/>
+          <a:lstStyle/>
+          <a:p>
+            <a:pPr algn="ctr"/>
+            <a:r>
+              <a:rPr lang="en-US" dirty="0" smtClean="0">
+                <a:solidFill>
+                  <a:srgbClr val="7030A0"/>
+                </a:solidFill>
+                <a:latin typeface="Calibri (Corps)"/>
+                <a:cs typeface="Segoe UI Light" panose="020B0502040204020203" pitchFamily="34" charset="0"/>
+              </a:rPr>
+              <a:t>Divide two numbers</a:t>
+            </a:r>
+            <a:endParaRPr lang="en-US" dirty="0">
+              <a:solidFill>
+                <a:srgbClr val="7030A0"/>
+              </a:solidFill>
+              <a:latin typeface="Calibri (Corps)"/>
+              <a:cs typeface="Segoe UI Light" panose="020B0502040204020203" pitchFamily="34" charset="0"/>
+            </a:endParaRPr>
+          </a:p>
+        </p:txBody>
+      </p:sp>
+      <p:sp>
+        <p:nvSpPr>
+          <p:cNvPr id="24" name="Rectangle 23"/>
+          <p:cNvSpPr/>
+          <p:nvPr/>
+        </p:nvSpPr>
+        <p:spPr>
+          <a:xfrm>
+            <a:off x="572654" y="4487192"/>
+            <a:ext cx="609600" cy="591128"/>
+          </a:xfrm>
+          <a:prstGeom prst="rect">
+            <a:avLst/>
+          </a:prstGeom>
+          <a:solidFill>
+            <a:srgbClr val="660066"/>
+          </a:solidFill>
+          <a:ln w="28575">
+            <a:solidFill>
+              <a:srgbClr val="660066"/>
+            </a:solidFill>
+          </a:ln>
+        </p:spPr>
+        <p:style>
+          <a:lnRef idx="2">
+            <a:schemeClr val="accent1">
+              <a:shade val="50000"/>
+            </a:schemeClr>
+          </a:lnRef>
+          <a:fillRef idx="1">
+            <a:schemeClr val="accent1"/>
+          </a:fillRef>
+          <a:effectRef idx="0">
+            <a:schemeClr val="accent1"/>
+          </a:effectRef>
+          <a:fontRef idx="minor">
+            <a:schemeClr val="lt1"/>
+          </a:fontRef>
+        </p:style>
+        <p:txBody>
+          <a:bodyPr rtlCol="0" anchor="ctr"/>
+          <a:lstStyle/>
+          <a:p>
+            <a:pPr algn="ctr"/>
+            <a:r>
+              <a:rPr lang="en-US" dirty="0" smtClean="0">
+                <a:latin typeface="Calibri (Corps)"/>
+                <a:cs typeface="Segoe UI Light" panose="020B0502040204020203" pitchFamily="34" charset="0"/>
+              </a:rPr>
+              <a:t>%</a:t>
+            </a:r>
+          </a:p>
+        </p:txBody>
+      </p:sp>
+      <p:sp>
+        <p:nvSpPr>
+          <p:cNvPr id="25" name="Rectangle 24"/>
+          <p:cNvSpPr/>
+          <p:nvPr/>
+        </p:nvSpPr>
+        <p:spPr>
+          <a:xfrm>
+            <a:off x="1496289" y="4487192"/>
+            <a:ext cx="4322620" cy="591128"/>
+          </a:xfrm>
+          <a:prstGeom prst="rect">
+            <a:avLst/>
+          </a:prstGeom>
+          <a:solidFill>
+            <a:srgbClr val="CC3399">
+              <a:alpha val="29020"/>
+            </a:srgbClr>
+          </a:solidFill>
+          <a:ln w="28575">
+            <a:solidFill>
+              <a:srgbClr val="7030A0"/>
+            </a:solidFill>
+          </a:ln>
+        </p:spPr>
+        <p:style>
+          <a:lnRef idx="2">
+            <a:schemeClr val="accent1">
+              <a:shade val="50000"/>
+            </a:schemeClr>
+          </a:lnRef>
+          <a:fillRef idx="1">
+            <a:schemeClr val="accent1"/>
+          </a:fillRef>
+          <a:effectRef idx="0">
+            <a:schemeClr val="accent1"/>
+          </a:effectRef>
+          <a:fontRef idx="minor">
+            <a:schemeClr val="lt1"/>
+          </a:fontRef>
+        </p:style>
+        <p:txBody>
+          <a:bodyPr rtlCol="0" anchor="ctr"/>
+          <a:lstStyle/>
+          <a:p>
+            <a:pPr algn="ctr"/>
+            <a:r>
+              <a:rPr lang="en-US" dirty="0" smtClean="0">
+                <a:solidFill>
+                  <a:srgbClr val="7030A0"/>
+                </a:solidFill>
+                <a:latin typeface="Calibri (Corps)"/>
+                <a:cs typeface="Segoe UI Light" panose="020B0502040204020203" pitchFamily="34" charset="0"/>
+              </a:rPr>
+              <a:t>Divide two numbers, yield remainder</a:t>
+            </a:r>
+            <a:endParaRPr lang="en-US" dirty="0">
+              <a:solidFill>
+                <a:srgbClr val="7030A0"/>
+              </a:solidFill>
+              <a:latin typeface="Calibri (Corps)"/>
+              <a:cs typeface="Segoe UI Light" panose="020B0502040204020203" pitchFamily="34" charset="0"/>
+            </a:endParaRPr>
+          </a:p>
+        </p:txBody>
+      </p:sp>
+      <p:sp>
+        <p:nvSpPr>
+          <p:cNvPr id="26" name="Rectangle 25"/>
+          <p:cNvSpPr/>
+          <p:nvPr/>
+        </p:nvSpPr>
+        <p:spPr>
+          <a:xfrm>
+            <a:off x="572654" y="5374407"/>
+            <a:ext cx="609600" cy="591128"/>
+          </a:xfrm>
+          <a:prstGeom prst="rect">
+            <a:avLst/>
+          </a:prstGeom>
+          <a:solidFill>
+            <a:srgbClr val="660066"/>
+          </a:solidFill>
+          <a:ln w="28575">
+            <a:solidFill>
+              <a:srgbClr val="660066"/>
+            </a:solidFill>
+          </a:ln>
+        </p:spPr>
+        <p:style>
+          <a:lnRef idx="2">
+            <a:schemeClr val="accent1">
+              <a:shade val="50000"/>
+            </a:schemeClr>
+          </a:lnRef>
+          <a:fillRef idx="1">
+            <a:schemeClr val="accent1"/>
+          </a:fillRef>
+          <a:effectRef idx="0">
+            <a:schemeClr val="accent1"/>
+          </a:effectRef>
+          <a:fontRef idx="minor">
+            <a:schemeClr val="lt1"/>
+          </a:fontRef>
+        </p:style>
+        <p:txBody>
+          <a:bodyPr rtlCol="0" anchor="ctr"/>
+          <a:lstStyle/>
+          <a:p>
+            <a:pPr algn="ctr"/>
+            <a:r>
+              <a:rPr lang="en-US" dirty="0" smtClean="0">
+                <a:latin typeface="Calibri (Corps)"/>
+                <a:cs typeface="Segoe UI Light" panose="020B0502040204020203" pitchFamily="34" charset="0"/>
+              </a:rPr>
+              <a:t>**</a:t>
+            </a:r>
+          </a:p>
+        </p:txBody>
+      </p:sp>
+      <p:sp>
+        <p:nvSpPr>
+          <p:cNvPr id="27" name="Rectangle 26"/>
+          <p:cNvSpPr/>
+          <p:nvPr/>
+        </p:nvSpPr>
+        <p:spPr>
+          <a:xfrm>
+            <a:off x="1496289" y="5374407"/>
+            <a:ext cx="4322620" cy="591128"/>
+          </a:xfrm>
+          <a:prstGeom prst="rect">
+            <a:avLst/>
+          </a:prstGeom>
+          <a:solidFill>
+            <a:srgbClr val="CC3399">
+              <a:alpha val="29020"/>
+            </a:srgbClr>
+          </a:solidFill>
+          <a:ln w="28575">
+            <a:solidFill>
+              <a:srgbClr val="7030A0"/>
+            </a:solidFill>
+          </a:ln>
+        </p:spPr>
+        <p:style>
+          <a:lnRef idx="2">
+            <a:schemeClr val="accent1">
+              <a:shade val="50000"/>
+            </a:schemeClr>
+          </a:lnRef>
+          <a:fillRef idx="1">
+            <a:schemeClr val="accent1"/>
+          </a:fillRef>
+          <a:effectRef idx="0">
+            <a:schemeClr val="accent1"/>
+          </a:effectRef>
+          <a:fontRef idx="minor">
+            <a:schemeClr val="lt1"/>
+          </a:fontRef>
+        </p:style>
+        <p:txBody>
+          <a:bodyPr rtlCol="0" anchor="ctr"/>
+          <a:lstStyle/>
+          <a:p>
+            <a:pPr algn="ctr"/>
+            <a:r>
+              <a:rPr lang="en-US" dirty="0" smtClean="0">
+                <a:solidFill>
+                  <a:srgbClr val="7030A0"/>
+                </a:solidFill>
+                <a:latin typeface="Calibri (Corps)"/>
+                <a:cs typeface="Segoe UI Light" panose="020B0502040204020203" pitchFamily="34" charset="0"/>
+              </a:rPr>
+              <a:t>Exponentiation (e.g. 2 ** 3 = 8)</a:t>
+            </a:r>
+            <a:endParaRPr lang="en-US" dirty="0">
+              <a:solidFill>
+                <a:srgbClr val="7030A0"/>
+              </a:solidFill>
+              <a:latin typeface="Calibri (Corps)"/>
+              <a:cs typeface="Segoe UI Light" panose="020B0502040204020203" pitchFamily="34" charset="0"/>
+            </a:endParaRPr>
+          </a:p>
+        </p:txBody>
+      </p:sp>
+      <p:sp>
+        <p:nvSpPr>
+          <p:cNvPr id="28" name="Rectangle 27"/>
+          <p:cNvSpPr/>
+          <p:nvPr/>
+        </p:nvSpPr>
+        <p:spPr>
+          <a:xfrm>
+            <a:off x="6262252" y="1051583"/>
+            <a:ext cx="609600" cy="591128"/>
+          </a:xfrm>
+          <a:prstGeom prst="rect">
+            <a:avLst/>
+          </a:prstGeom>
+          <a:solidFill>
+            <a:schemeClr val="accent2"/>
+          </a:solidFill>
+          <a:ln w="28575">
+            <a:solidFill>
+              <a:schemeClr val="accent2"/>
+            </a:solidFill>
+          </a:ln>
+        </p:spPr>
+        <p:style>
+          <a:lnRef idx="2">
+            <a:schemeClr val="accent1">
+              <a:shade val="50000"/>
+            </a:schemeClr>
+          </a:lnRef>
+          <a:fillRef idx="1">
+            <a:schemeClr val="accent1"/>
+          </a:fillRef>
+          <a:effectRef idx="0">
+            <a:schemeClr val="accent1"/>
+          </a:effectRef>
+          <a:fontRef idx="minor">
+            <a:schemeClr val="lt1"/>
+          </a:fontRef>
+        </p:style>
+        <p:txBody>
+          <a:bodyPr rtlCol="0" anchor="ctr"/>
+          <a:lstStyle/>
+          <a:p>
+            <a:pPr algn="ctr"/>
+            <a:r>
+              <a:rPr lang="en-US" sz="1600" dirty="0" smtClean="0">
+                <a:latin typeface="Calibri (Corps)"/>
+              </a:rPr>
+              <a:t>=</a:t>
+            </a:r>
+          </a:p>
+        </p:txBody>
+      </p:sp>
+      <p:sp>
+        <p:nvSpPr>
+          <p:cNvPr id="29" name="Rectangle 28"/>
+          <p:cNvSpPr/>
+          <p:nvPr/>
+        </p:nvSpPr>
+        <p:spPr>
+          <a:xfrm>
+            <a:off x="7051964" y="1043710"/>
+            <a:ext cx="4253345" cy="599002"/>
+          </a:xfrm>
+          <a:prstGeom prst="rect">
+            <a:avLst/>
+          </a:prstGeom>
+          <a:solidFill>
+            <a:srgbClr val="FF9900">
+              <a:alpha val="30196"/>
+            </a:srgbClr>
+          </a:solidFill>
+          <a:ln w="28575">
+            <a:solidFill>
+              <a:srgbClr val="FF9933"/>
+            </a:solidFill>
+          </a:ln>
+        </p:spPr>
+        <p:style>
+          <a:lnRef idx="2">
+            <a:schemeClr val="accent1">
+              <a:shade val="50000"/>
+            </a:schemeClr>
+          </a:lnRef>
+          <a:fillRef idx="1">
+            <a:schemeClr val="accent1"/>
+          </a:fillRef>
+          <a:effectRef idx="0">
+            <a:schemeClr val="accent1"/>
+          </a:effectRef>
+          <a:fontRef idx="minor">
+            <a:schemeClr val="lt1"/>
+          </a:fontRef>
+        </p:style>
+        <p:txBody>
+          <a:bodyPr rtlCol="0" anchor="ctr"/>
+          <a:lstStyle/>
+          <a:p>
+            <a:pPr algn="ctr"/>
+            <a:r>
+              <a:rPr lang="en-US" sz="2000" dirty="0" smtClean="0">
+                <a:solidFill>
+                  <a:srgbClr val="FF9900"/>
+                </a:solidFill>
+              </a:rPr>
+              <a:t>Assign value to variable</a:t>
+            </a:r>
+            <a:endParaRPr lang="en-US" sz="2000" dirty="0" smtClean="0">
+              <a:solidFill>
+                <a:srgbClr val="FF9900"/>
+              </a:solidFill>
+            </a:endParaRPr>
+          </a:p>
+        </p:txBody>
+      </p:sp>
+    </p:spTree>
+    <p:extLst>
+      <p:ext uri="{BB962C8B-B14F-4D97-AF65-F5344CB8AC3E}">
+        <p14:creationId xmlns:p14="http://schemas.microsoft.com/office/powerpoint/2010/main" val="18731417"/>
       </p:ext>
     </p:extLst>
   </p:cSld>

</xml_diff>

<commit_message>
9. Understanding the Starting Code 10. Data Types Numbers & Strings (Text)
</commit_message>
<xml_diff>
--- a/2. Basics Variables, Data Types, Operators & Functions/docs/Introduction.pptx
+++ b/2. Basics Variables, Data Types, Operators & Functions/docs/Introduction.pptx
@@ -10,6 +10,7 @@
     <p:sldId id="258" r:id="rId4"/>
     <p:sldId id="259" r:id="rId5"/>
     <p:sldId id="261" r:id="rId6"/>
+    <p:sldId id="262" r:id="rId7"/>
   </p:sldIdLst>
   <p:sldSz cx="12192000" cy="6858000"/>
   <p:notesSz cx="6858000" cy="9144000"/>
@@ -6366,6 +6367,567 @@
     <p:extLst>
       <p:ext uri="{BB962C8B-B14F-4D97-AF65-F5344CB8AC3E}">
         <p14:creationId xmlns:p14="http://schemas.microsoft.com/office/powerpoint/2010/main" val="18731417"/>
+      </p:ext>
+    </p:extLst>
+  </p:cSld>
+  <p:clrMapOvr>
+    <a:masterClrMapping/>
+  </p:clrMapOvr>
+</p:sld>
+</file>
+
+<file path=ppt/slides/slide6.xml><?xml version="1.0" encoding="utf-8"?>
+<p:sld xmlns:a="http://schemas.openxmlformats.org/drawingml/2006/main" xmlns:r="http://schemas.openxmlformats.org/officeDocument/2006/relationships" xmlns:p="http://schemas.openxmlformats.org/presentationml/2006/main">
+  <p:cSld>
+    <p:spTree>
+      <p:nvGrpSpPr>
+        <p:cNvPr id="1" name=""/>
+        <p:cNvGrpSpPr/>
+        <p:nvPr/>
+      </p:nvGrpSpPr>
+      <p:grpSpPr>
+        <a:xfrm>
+          <a:off x="0" y="0"/>
+          <a:ext cx="0" cy="0"/>
+          <a:chOff x="0" y="0"/>
+          <a:chExt cx="0" cy="0"/>
+        </a:xfrm>
+      </p:grpSpPr>
+      <p:sp>
+        <p:nvSpPr>
+          <p:cNvPr id="2" name="Rectangle 1"/>
+          <p:cNvSpPr/>
+          <p:nvPr/>
+        </p:nvSpPr>
+        <p:spPr>
+          <a:xfrm>
+            <a:off x="406398" y="1013270"/>
+            <a:ext cx="2623129" cy="704693"/>
+          </a:xfrm>
+          <a:prstGeom prst="rect">
+            <a:avLst/>
+          </a:prstGeom>
+          <a:solidFill>
+            <a:srgbClr val="660066"/>
+          </a:solidFill>
+          <a:ln w="28575">
+            <a:solidFill>
+              <a:srgbClr val="660066"/>
+            </a:solidFill>
+          </a:ln>
+        </p:spPr>
+        <p:style>
+          <a:lnRef idx="2">
+            <a:schemeClr val="accent1">
+              <a:shade val="50000"/>
+            </a:schemeClr>
+          </a:lnRef>
+          <a:fillRef idx="1">
+            <a:schemeClr val="accent1"/>
+          </a:fillRef>
+          <a:effectRef idx="0">
+            <a:schemeClr val="accent1"/>
+          </a:effectRef>
+          <a:fontRef idx="minor">
+            <a:schemeClr val="lt1"/>
+          </a:fontRef>
+        </p:style>
+        <p:txBody>
+          <a:bodyPr rtlCol="0" anchor="ctr"/>
+          <a:lstStyle/>
+          <a:p>
+            <a:pPr algn="ctr"/>
+            <a:r>
+              <a:rPr lang="en-US" dirty="0" smtClean="0">
+                <a:latin typeface="Calibri (Corps)"/>
+                <a:cs typeface="Segoe UI Light" panose="020B0502040204020203" pitchFamily="34" charset="0"/>
+              </a:rPr>
+              <a:t>Numbers</a:t>
+            </a:r>
+            <a:endParaRPr lang="en-US" dirty="0">
+              <a:latin typeface="Calibri (Corps)"/>
+              <a:cs typeface="Segoe UI Light" panose="020B0502040204020203" pitchFamily="34" charset="0"/>
+            </a:endParaRPr>
+          </a:p>
+        </p:txBody>
+      </p:sp>
+      <p:sp>
+        <p:nvSpPr>
+          <p:cNvPr id="3" name="ZoneTexte 2"/>
+          <p:cNvSpPr txBox="1"/>
+          <p:nvPr/>
+        </p:nvSpPr>
+        <p:spPr>
+          <a:xfrm>
+            <a:off x="489527" y="193964"/>
+            <a:ext cx="4368799" cy="523220"/>
+          </a:xfrm>
+          <a:prstGeom prst="rect">
+            <a:avLst/>
+          </a:prstGeom>
+          <a:noFill/>
+        </p:spPr>
+        <p:txBody>
+          <a:bodyPr wrap="square" rtlCol="0">
+            <a:spAutoFit/>
+          </a:bodyPr>
+          <a:lstStyle/>
+          <a:p>
+            <a:r>
+              <a:rPr lang="en-US" sz="2800" b="1" dirty="0" smtClean="0">
+                <a:ea typeface="Segoe UI Black" panose="020B0A02040204020203" pitchFamily="34" charset="0"/>
+                <a:cs typeface="Segoe UI Semibold" panose="020B0702040204020203" pitchFamily="34" charset="0"/>
+              </a:rPr>
+              <a:t>Data Types</a:t>
+            </a:r>
+            <a:endParaRPr lang="en-US" sz="2800" b="1" dirty="0">
+              <a:ea typeface="Segoe UI Black" panose="020B0A02040204020203" pitchFamily="34" charset="0"/>
+              <a:cs typeface="Segoe UI Semibold" panose="020B0702040204020203" pitchFamily="34" charset="0"/>
+            </a:endParaRPr>
+          </a:p>
+        </p:txBody>
+      </p:sp>
+      <p:sp>
+        <p:nvSpPr>
+          <p:cNvPr id="7" name="Rectangle 6"/>
+          <p:cNvSpPr/>
+          <p:nvPr/>
+        </p:nvSpPr>
+        <p:spPr>
+          <a:xfrm>
+            <a:off x="3371271" y="1013271"/>
+            <a:ext cx="2927929" cy="704692"/>
+          </a:xfrm>
+          <a:prstGeom prst="rect">
+            <a:avLst/>
+          </a:prstGeom>
+          <a:solidFill>
+            <a:srgbClr val="CC3399">
+              <a:alpha val="29020"/>
+            </a:srgbClr>
+          </a:solidFill>
+          <a:ln w="28575">
+            <a:solidFill>
+              <a:srgbClr val="7030A0"/>
+            </a:solidFill>
+          </a:ln>
+        </p:spPr>
+        <p:style>
+          <a:lnRef idx="2">
+            <a:schemeClr val="accent1">
+              <a:shade val="50000"/>
+            </a:schemeClr>
+          </a:lnRef>
+          <a:fillRef idx="1">
+            <a:schemeClr val="accent1"/>
+          </a:fillRef>
+          <a:effectRef idx="0">
+            <a:schemeClr val="accent1"/>
+          </a:effectRef>
+          <a:fontRef idx="minor">
+            <a:schemeClr val="lt1"/>
+          </a:fontRef>
+        </p:style>
+        <p:txBody>
+          <a:bodyPr rtlCol="0" anchor="ctr"/>
+          <a:lstStyle/>
+          <a:p>
+            <a:pPr algn="ctr"/>
+            <a:r>
+              <a:rPr lang="en-US" dirty="0" smtClean="0">
+                <a:solidFill>
+                  <a:srgbClr val="7030A0"/>
+                </a:solidFill>
+                <a:latin typeface="Calibri (Corps)"/>
+                <a:cs typeface="Segoe UI Light" panose="020B0502040204020203" pitchFamily="34" charset="0"/>
+              </a:rPr>
+              <a:t>2, -3, 22.959</a:t>
+            </a:r>
+            <a:endParaRPr lang="en-US" dirty="0">
+              <a:solidFill>
+                <a:srgbClr val="7030A0"/>
+              </a:solidFill>
+              <a:latin typeface="Calibri (Corps)"/>
+              <a:cs typeface="Segoe UI Light" panose="020B0502040204020203" pitchFamily="34" charset="0"/>
+            </a:endParaRPr>
+          </a:p>
+        </p:txBody>
+      </p:sp>
+      <p:sp>
+        <p:nvSpPr>
+          <p:cNvPr id="28" name="Rectangle 27"/>
+          <p:cNvSpPr/>
+          <p:nvPr/>
+        </p:nvSpPr>
+        <p:spPr>
+          <a:xfrm>
+            <a:off x="9363363" y="4570637"/>
+            <a:ext cx="609600" cy="591128"/>
+          </a:xfrm>
+          <a:prstGeom prst="rect">
+            <a:avLst/>
+          </a:prstGeom>
+          <a:solidFill>
+            <a:schemeClr val="accent2"/>
+          </a:solidFill>
+          <a:ln w="28575">
+            <a:solidFill>
+              <a:schemeClr val="accent2"/>
+            </a:solidFill>
+          </a:ln>
+        </p:spPr>
+        <p:style>
+          <a:lnRef idx="2">
+            <a:schemeClr val="accent1">
+              <a:shade val="50000"/>
+            </a:schemeClr>
+          </a:lnRef>
+          <a:fillRef idx="1">
+            <a:schemeClr val="accent1"/>
+          </a:fillRef>
+          <a:effectRef idx="0">
+            <a:schemeClr val="accent1"/>
+          </a:effectRef>
+          <a:fontRef idx="minor">
+            <a:schemeClr val="lt1"/>
+          </a:fontRef>
+        </p:style>
+        <p:txBody>
+          <a:bodyPr rtlCol="0" anchor="ctr"/>
+          <a:lstStyle/>
+          <a:p>
+            <a:pPr algn="ctr"/>
+            <a:r>
+              <a:rPr lang="en-US" sz="1600" dirty="0" smtClean="0">
+                <a:latin typeface="Calibri (Corps)"/>
+              </a:rPr>
+              <a:t>=</a:t>
+            </a:r>
+          </a:p>
+        </p:txBody>
+      </p:sp>
+      <p:sp>
+        <p:nvSpPr>
+          <p:cNvPr id="29" name="Rectangle 28"/>
+          <p:cNvSpPr/>
+          <p:nvPr/>
+        </p:nvSpPr>
+        <p:spPr>
+          <a:xfrm>
+            <a:off x="7541491" y="5800437"/>
+            <a:ext cx="4253345" cy="599002"/>
+          </a:xfrm>
+          <a:prstGeom prst="rect">
+            <a:avLst/>
+          </a:prstGeom>
+          <a:solidFill>
+            <a:srgbClr val="FF9900">
+              <a:alpha val="30196"/>
+            </a:srgbClr>
+          </a:solidFill>
+          <a:ln w="28575">
+            <a:solidFill>
+              <a:srgbClr val="FF9933"/>
+            </a:solidFill>
+          </a:ln>
+        </p:spPr>
+        <p:style>
+          <a:lnRef idx="2">
+            <a:schemeClr val="accent1">
+              <a:shade val="50000"/>
+            </a:schemeClr>
+          </a:lnRef>
+          <a:fillRef idx="1">
+            <a:schemeClr val="accent1"/>
+          </a:fillRef>
+          <a:effectRef idx="0">
+            <a:schemeClr val="accent1"/>
+          </a:effectRef>
+          <a:fontRef idx="minor">
+            <a:schemeClr val="lt1"/>
+          </a:fontRef>
+        </p:style>
+        <p:txBody>
+          <a:bodyPr rtlCol="0" anchor="ctr"/>
+          <a:lstStyle/>
+          <a:p>
+            <a:pPr algn="ctr"/>
+            <a:r>
+              <a:rPr lang="en-US" sz="2000" dirty="0" smtClean="0">
+                <a:solidFill>
+                  <a:srgbClr val="FF9900"/>
+                </a:solidFill>
+              </a:rPr>
+              <a:t>Assign value to variable</a:t>
+            </a:r>
+            <a:endParaRPr lang="en-US" sz="2000" dirty="0" smtClean="0">
+              <a:solidFill>
+                <a:srgbClr val="FF9900"/>
+              </a:solidFill>
+            </a:endParaRPr>
+          </a:p>
+        </p:txBody>
+      </p:sp>
+      <p:sp>
+        <p:nvSpPr>
+          <p:cNvPr id="17" name="Rectangle 16"/>
+          <p:cNvSpPr/>
+          <p:nvPr/>
+        </p:nvSpPr>
+        <p:spPr>
+          <a:xfrm>
+            <a:off x="6793343" y="1013271"/>
+            <a:ext cx="4322620" cy="704692"/>
+          </a:xfrm>
+          <a:prstGeom prst="rect">
+            <a:avLst/>
+          </a:prstGeom>
+          <a:solidFill>
+            <a:srgbClr val="CC3399">
+              <a:alpha val="29020"/>
+            </a:srgbClr>
+          </a:solidFill>
+          <a:ln w="28575">
+            <a:solidFill>
+              <a:srgbClr val="7030A0"/>
+            </a:solidFill>
+          </a:ln>
+        </p:spPr>
+        <p:style>
+          <a:lnRef idx="2">
+            <a:schemeClr val="accent1">
+              <a:shade val="50000"/>
+            </a:schemeClr>
+          </a:lnRef>
+          <a:fillRef idx="1">
+            <a:schemeClr val="accent1"/>
+          </a:fillRef>
+          <a:effectRef idx="0">
+            <a:schemeClr val="accent1"/>
+          </a:effectRef>
+          <a:fontRef idx="minor">
+            <a:schemeClr val="lt1"/>
+          </a:fontRef>
+        </p:style>
+        <p:txBody>
+          <a:bodyPr rtlCol="0" anchor="ctr"/>
+          <a:lstStyle/>
+          <a:p>
+            <a:pPr algn="ctr"/>
+            <a:r>
+              <a:rPr lang="en-US" dirty="0" smtClean="0">
+                <a:solidFill>
+                  <a:srgbClr val="7030A0"/>
+                </a:solidFill>
+                <a:latin typeface="Calibri (Corps)"/>
+                <a:cs typeface="Segoe UI Light" panose="020B0502040204020203" pitchFamily="34" charset="0"/>
+              </a:rPr>
+              <a:t>Important for calculations and code where you need to “work with a number”</a:t>
+            </a:r>
+            <a:endParaRPr lang="en-US" dirty="0">
+              <a:solidFill>
+                <a:srgbClr val="7030A0"/>
+              </a:solidFill>
+              <a:latin typeface="Calibri (Corps)"/>
+              <a:cs typeface="Segoe UI Light" panose="020B0502040204020203" pitchFamily="34" charset="0"/>
+            </a:endParaRPr>
+          </a:p>
+        </p:txBody>
+      </p:sp>
+      <p:sp>
+        <p:nvSpPr>
+          <p:cNvPr id="18" name="Rectangle 17"/>
+          <p:cNvSpPr/>
+          <p:nvPr/>
+        </p:nvSpPr>
+        <p:spPr>
+          <a:xfrm>
+            <a:off x="429488" y="2177054"/>
+            <a:ext cx="2623129" cy="704693"/>
+          </a:xfrm>
+          <a:prstGeom prst="rect">
+            <a:avLst/>
+          </a:prstGeom>
+          <a:solidFill>
+            <a:srgbClr val="660066"/>
+          </a:solidFill>
+          <a:ln w="28575">
+            <a:solidFill>
+              <a:srgbClr val="660066"/>
+            </a:solidFill>
+          </a:ln>
+        </p:spPr>
+        <p:style>
+          <a:lnRef idx="2">
+            <a:schemeClr val="accent1">
+              <a:shade val="50000"/>
+            </a:schemeClr>
+          </a:lnRef>
+          <a:fillRef idx="1">
+            <a:schemeClr val="accent1"/>
+          </a:fillRef>
+          <a:effectRef idx="0">
+            <a:schemeClr val="accent1"/>
+          </a:effectRef>
+          <a:fontRef idx="minor">
+            <a:schemeClr val="lt1"/>
+          </a:fontRef>
+        </p:style>
+        <p:txBody>
+          <a:bodyPr rtlCol="0" anchor="ctr"/>
+          <a:lstStyle/>
+          <a:p>
+            <a:pPr algn="ctr"/>
+            <a:r>
+              <a:rPr lang="en-US" dirty="0" smtClean="0">
+                <a:latin typeface="Calibri (Corps)"/>
+                <a:cs typeface="Segoe UI Light" panose="020B0502040204020203" pitchFamily="34" charset="0"/>
+              </a:rPr>
+              <a:t>String (Text)</a:t>
+            </a:r>
+            <a:endParaRPr lang="en-US" dirty="0">
+              <a:latin typeface="Calibri (Corps)"/>
+              <a:cs typeface="Segoe UI Light" panose="020B0502040204020203" pitchFamily="34" charset="0"/>
+            </a:endParaRPr>
+          </a:p>
+        </p:txBody>
+      </p:sp>
+      <p:sp>
+        <p:nvSpPr>
+          <p:cNvPr id="19" name="Rectangle 18"/>
+          <p:cNvSpPr/>
+          <p:nvPr/>
+        </p:nvSpPr>
+        <p:spPr>
+          <a:xfrm>
+            <a:off x="3394361" y="2177055"/>
+            <a:ext cx="2927929" cy="704692"/>
+          </a:xfrm>
+          <a:prstGeom prst="rect">
+            <a:avLst/>
+          </a:prstGeom>
+          <a:solidFill>
+            <a:srgbClr val="CC3399">
+              <a:alpha val="29020"/>
+            </a:srgbClr>
+          </a:solidFill>
+          <a:ln w="28575">
+            <a:solidFill>
+              <a:srgbClr val="7030A0"/>
+            </a:solidFill>
+          </a:ln>
+        </p:spPr>
+        <p:style>
+          <a:lnRef idx="2">
+            <a:schemeClr val="accent1">
+              <a:shade val="50000"/>
+            </a:schemeClr>
+          </a:lnRef>
+          <a:fillRef idx="1">
+            <a:schemeClr val="accent1"/>
+          </a:fillRef>
+          <a:effectRef idx="0">
+            <a:schemeClr val="accent1"/>
+          </a:effectRef>
+          <a:fontRef idx="minor">
+            <a:schemeClr val="lt1"/>
+          </a:fontRef>
+        </p:style>
+        <p:txBody>
+          <a:bodyPr rtlCol="0" anchor="ctr"/>
+          <a:lstStyle/>
+          <a:p>
+            <a:pPr algn="ctr"/>
+            <a:r>
+              <a:rPr lang="en-US" dirty="0" smtClean="0">
+                <a:solidFill>
+                  <a:srgbClr val="7030A0"/>
+                </a:solidFill>
+                <a:latin typeface="Calibri (Corps)"/>
+                <a:cs typeface="Segoe UI Light" panose="020B0502040204020203" pitchFamily="34" charset="0"/>
+              </a:rPr>
+              <a:t>‘Hi’, “Hi”, `Hi`</a:t>
+            </a:r>
+            <a:endParaRPr lang="en-US" dirty="0">
+              <a:solidFill>
+                <a:srgbClr val="7030A0"/>
+              </a:solidFill>
+              <a:latin typeface="Calibri (Corps)"/>
+              <a:cs typeface="Segoe UI Light" panose="020B0502040204020203" pitchFamily="34" charset="0"/>
+            </a:endParaRPr>
+          </a:p>
+        </p:txBody>
+      </p:sp>
+      <p:sp>
+        <p:nvSpPr>
+          <p:cNvPr id="30" name="Rectangle 29"/>
+          <p:cNvSpPr/>
+          <p:nvPr/>
+        </p:nvSpPr>
+        <p:spPr>
+          <a:xfrm>
+            <a:off x="6816433" y="2177055"/>
+            <a:ext cx="4322620" cy="704692"/>
+          </a:xfrm>
+          <a:prstGeom prst="rect">
+            <a:avLst/>
+          </a:prstGeom>
+          <a:solidFill>
+            <a:srgbClr val="CC3399">
+              <a:alpha val="29020"/>
+            </a:srgbClr>
+          </a:solidFill>
+          <a:ln w="28575">
+            <a:solidFill>
+              <a:srgbClr val="7030A0"/>
+            </a:solidFill>
+          </a:ln>
+        </p:spPr>
+        <p:style>
+          <a:lnRef idx="2">
+            <a:schemeClr val="accent1">
+              <a:shade val="50000"/>
+            </a:schemeClr>
+          </a:lnRef>
+          <a:fillRef idx="1">
+            <a:schemeClr val="accent1"/>
+          </a:fillRef>
+          <a:effectRef idx="0">
+            <a:schemeClr val="accent1"/>
+          </a:effectRef>
+          <a:fontRef idx="minor">
+            <a:schemeClr val="lt1"/>
+          </a:fontRef>
+        </p:style>
+        <p:txBody>
+          <a:bodyPr rtlCol="0" anchor="ctr"/>
+          <a:lstStyle/>
+          <a:p>
+            <a:pPr algn="ctr"/>
+            <a:r>
+              <a:rPr lang="en-US" dirty="0" smtClean="0">
+                <a:solidFill>
+                  <a:srgbClr val="7030A0"/>
+                </a:solidFill>
+                <a:latin typeface="Calibri (Corps)"/>
+                <a:cs typeface="Segoe UI Light" panose="020B0502040204020203" pitchFamily="34" charset="0"/>
+              </a:rPr>
+              <a:t>Important for outputting results, gathering input</a:t>
+            </a:r>
+            <a:endParaRPr lang="en-US" dirty="0">
+              <a:solidFill>
+                <a:srgbClr val="7030A0"/>
+              </a:solidFill>
+              <a:latin typeface="Calibri (Corps)"/>
+              <a:cs typeface="Segoe UI Light" panose="020B0502040204020203" pitchFamily="34" charset="0"/>
+            </a:endParaRPr>
+          </a:p>
+        </p:txBody>
+      </p:sp>
+    </p:spTree>
+    <p:extLst>
+      <p:ext uri="{BB962C8B-B14F-4D97-AF65-F5344CB8AC3E}">
+        <p14:creationId xmlns:p14="http://schemas.microsoft.com/office/powerpoint/2010/main" val="585312863"/>
       </p:ext>
     </p:extLst>
   </p:cSld>

</xml_diff>

<commit_message>
33. More Core Data Types!
</commit_message>
<xml_diff>
--- a/2. Basics Variables, Data Types, Operators & Functions/docs/Introduction.pptx
+++ b/2. Basics Variables, Data Types, Operators & Functions/docs/Introduction.pptx
@@ -5458,6 +5458,13 @@
   <p:clrMapOvr>
     <a:masterClrMapping/>
   </p:clrMapOvr>
+  <p:timing>
+    <p:tnLst>
+      <p:par>
+        <p:cTn id="1" dur="indefinite" restart="never" nodeType="tmRoot"/>
+      </p:par>
+    </p:tnLst>
+  </p:timing>
 </p:sld>
 </file>
 
@@ -6628,6 +6635,13 @@
   <p:clrMapOvr>
     <a:masterClrMapping/>
   </p:clrMapOvr>
+  <p:timing>
+    <p:tnLst>
+      <p:par>
+        <p:cTn id="1" dur="indefinite" restart="never" nodeType="tmRoot"/>
+      </p:par>
+    </p:tnLst>
+  </p:timing>
 </p:sld>
 </file>
 
@@ -6810,26 +6824,26 @@
       </p:sp>
       <p:sp>
         <p:nvSpPr>
-          <p:cNvPr id="29" name="Rectangle 28"/>
+          <p:cNvPr id="17" name="Rectangle 16"/>
           <p:cNvSpPr/>
           <p:nvPr/>
         </p:nvSpPr>
         <p:spPr>
           <a:xfrm>
-            <a:off x="7541491" y="5800437"/>
-            <a:ext cx="4253345" cy="599002"/>
+            <a:off x="6793343" y="1013271"/>
+            <a:ext cx="4322620" cy="704692"/>
           </a:xfrm>
           <a:prstGeom prst="rect">
             <a:avLst/>
           </a:prstGeom>
           <a:solidFill>
-            <a:srgbClr val="FF9900">
-              <a:alpha val="30196"/>
+            <a:srgbClr val="CC3399">
+              <a:alpha val="29020"/>
             </a:srgbClr>
           </a:solidFill>
           <a:ln w="28575">
             <a:solidFill>
-              <a:srgbClr val="FF9933"/>
+              <a:srgbClr val="7030A0"/>
             </a:solidFill>
           </a:ln>
         </p:spPr>
@@ -6853,45 +6867,46 @@
           <a:bodyPr rtlCol="0" anchor="ctr"/>
           <a:lstStyle/>
           <a:p>
-            <a:pPr algn="ctr"/>
-            <a:r>
-              <a:rPr lang="en-US" sz="2000" dirty="0" smtClean="0">
+            <a:r>
+              <a:rPr lang="en-US" dirty="0" smtClean="0">
                 <a:solidFill>
-                  <a:srgbClr val="FF9900"/>
+                  <a:srgbClr val="7030A0"/>
                 </a:solidFill>
-              </a:rPr>
-              <a:t>Assign value to variable</a:t>
-            </a:r>
-            <a:endParaRPr lang="en-US" sz="2000" dirty="0" smtClean="0">
+                <a:latin typeface="Calibri (Corps)"/>
+                <a:cs typeface="Segoe UI Light" panose="020B0502040204020203" pitchFamily="34" charset="0"/>
+              </a:rPr>
+              <a:t>Important for calculations and code where you need to “work with a number”</a:t>
+            </a:r>
+            <a:endParaRPr lang="en-US" dirty="0">
               <a:solidFill>
-                <a:srgbClr val="FF9900"/>
+                <a:srgbClr val="7030A0"/>
               </a:solidFill>
+              <a:latin typeface="Calibri (Corps)"/>
+              <a:cs typeface="Segoe UI Light" panose="020B0502040204020203" pitchFamily="34" charset="0"/>
             </a:endParaRPr>
           </a:p>
         </p:txBody>
       </p:sp>
       <p:sp>
         <p:nvSpPr>
-          <p:cNvPr id="17" name="Rectangle 16"/>
+          <p:cNvPr id="18" name="Rectangle 17"/>
           <p:cNvSpPr/>
           <p:nvPr/>
         </p:nvSpPr>
         <p:spPr>
           <a:xfrm>
-            <a:off x="6793343" y="1013271"/>
-            <a:ext cx="4322620" cy="704692"/>
+            <a:off x="429488" y="2177054"/>
+            <a:ext cx="2623129" cy="704693"/>
           </a:xfrm>
           <a:prstGeom prst="rect">
             <a:avLst/>
           </a:prstGeom>
           <a:solidFill>
-            <a:srgbClr val="CC3399">
-              <a:alpha val="29020"/>
-            </a:srgbClr>
+            <a:srgbClr val="660066"/>
           </a:solidFill>
           <a:ln w="28575">
             <a:solidFill>
-              <a:srgbClr val="7030A0"/>
+              <a:srgbClr val="660066"/>
             </a:solidFill>
           </a:ln>
         </p:spPr>
@@ -6918,13 +6933,73 @@
             <a:pPr algn="ctr"/>
             <a:r>
               <a:rPr lang="en-US" dirty="0" smtClean="0">
+                <a:latin typeface="Calibri (Corps)"/>
+                <a:cs typeface="Segoe UI Light" panose="020B0502040204020203" pitchFamily="34" charset="0"/>
+              </a:rPr>
+              <a:t>String (Text)</a:t>
+            </a:r>
+            <a:endParaRPr lang="en-US" dirty="0">
+              <a:latin typeface="Calibri (Corps)"/>
+              <a:cs typeface="Segoe UI Light" panose="020B0502040204020203" pitchFamily="34" charset="0"/>
+            </a:endParaRPr>
+          </a:p>
+        </p:txBody>
+      </p:sp>
+      <p:sp>
+        <p:nvSpPr>
+          <p:cNvPr id="19" name="Rectangle 18"/>
+          <p:cNvSpPr/>
+          <p:nvPr/>
+        </p:nvSpPr>
+        <p:spPr>
+          <a:xfrm>
+            <a:off x="3394361" y="2177055"/>
+            <a:ext cx="2927929" cy="704692"/>
+          </a:xfrm>
+          <a:prstGeom prst="rect">
+            <a:avLst/>
+          </a:prstGeom>
+          <a:solidFill>
+            <a:srgbClr val="CC3399">
+              <a:alpha val="29020"/>
+            </a:srgbClr>
+          </a:solidFill>
+          <a:ln w="28575">
+            <a:solidFill>
+              <a:srgbClr val="7030A0"/>
+            </a:solidFill>
+          </a:ln>
+        </p:spPr>
+        <p:style>
+          <a:lnRef idx="2">
+            <a:schemeClr val="accent1">
+              <a:shade val="50000"/>
+            </a:schemeClr>
+          </a:lnRef>
+          <a:fillRef idx="1">
+            <a:schemeClr val="accent1"/>
+          </a:fillRef>
+          <a:effectRef idx="0">
+            <a:schemeClr val="accent1"/>
+          </a:effectRef>
+          <a:fontRef idx="minor">
+            <a:schemeClr val="lt1"/>
+          </a:fontRef>
+        </p:style>
+        <p:txBody>
+          <a:bodyPr rtlCol="0" anchor="ctr"/>
+          <a:lstStyle/>
+          <a:p>
+            <a:pPr algn="ctr"/>
+            <a:r>
+              <a:rPr lang="en-US" dirty="0" smtClean="0">
                 <a:solidFill>
                   <a:srgbClr val="7030A0"/>
                 </a:solidFill>
                 <a:latin typeface="Calibri (Corps)"/>
                 <a:cs typeface="Segoe UI Light" panose="020B0502040204020203" pitchFamily="34" charset="0"/>
               </a:rPr>
-              <a:t>Important for calculations and code where you need to “work with a number”</a:t>
+              <a:t>‘Hi’, “Hi”, `Hi`</a:t>
             </a:r>
             <a:endParaRPr lang="en-US" dirty="0">
               <a:solidFill>
@@ -6938,24 +7013,26 @@
       </p:sp>
       <p:sp>
         <p:nvSpPr>
-          <p:cNvPr id="18" name="Rectangle 17"/>
+          <p:cNvPr id="30" name="Rectangle 29"/>
           <p:cNvSpPr/>
           <p:nvPr/>
         </p:nvSpPr>
         <p:spPr>
           <a:xfrm>
-            <a:off x="429488" y="2177054"/>
-            <a:ext cx="2623129" cy="704693"/>
+            <a:off x="6816433" y="2177055"/>
+            <a:ext cx="4322620" cy="704692"/>
           </a:xfrm>
           <a:prstGeom prst="rect">
             <a:avLst/>
           </a:prstGeom>
           <a:solidFill>
-            <a:srgbClr val="660066"/>
+            <a:srgbClr val="CC3399">
+              <a:alpha val="29020"/>
+            </a:srgbClr>
           </a:solidFill>
           <a:ln w="28575">
             <a:solidFill>
-              <a:srgbClr val="660066"/>
+              <a:srgbClr val="7030A0"/>
             </a:solidFill>
           </a:ln>
         </p:spPr>
@@ -6979,15 +7056,20 @@
           <a:bodyPr rtlCol="0" anchor="ctr"/>
           <a:lstStyle/>
           <a:p>
-            <a:pPr algn="ctr"/>
             <a:r>
               <a:rPr lang="en-US" dirty="0" smtClean="0">
+                <a:solidFill>
+                  <a:srgbClr val="7030A0"/>
+                </a:solidFill>
                 <a:latin typeface="Calibri (Corps)"/>
                 <a:cs typeface="Segoe UI Light" panose="020B0502040204020203" pitchFamily="34" charset="0"/>
               </a:rPr>
-              <a:t>String (Text)</a:t>
+              <a:t>Important for outputting results, gathering input</a:t>
             </a:r>
             <a:endParaRPr lang="en-US" dirty="0">
+              <a:solidFill>
+                <a:srgbClr val="7030A0"/>
+              </a:solidFill>
               <a:latin typeface="Calibri (Corps)"/>
               <a:cs typeface="Segoe UI Light" panose="020B0502040204020203" pitchFamily="34" charset="0"/>
             </a:endParaRPr>
@@ -6996,26 +7078,24 @@
       </p:sp>
       <p:sp>
         <p:nvSpPr>
-          <p:cNvPr id="19" name="Rectangle 18"/>
+          <p:cNvPr id="31" name="Rectangle 30"/>
           <p:cNvSpPr/>
           <p:nvPr/>
         </p:nvSpPr>
         <p:spPr>
           <a:xfrm>
-            <a:off x="3394361" y="2177055"/>
-            <a:ext cx="2927929" cy="704692"/>
+            <a:off x="406397" y="3340838"/>
+            <a:ext cx="2623129" cy="704693"/>
           </a:xfrm>
           <a:prstGeom prst="rect">
             <a:avLst/>
           </a:prstGeom>
           <a:solidFill>
-            <a:srgbClr val="CC3399">
-              <a:alpha val="29020"/>
-            </a:srgbClr>
+            <a:srgbClr val="660066"/>
           </a:solidFill>
           <a:ln w="28575">
             <a:solidFill>
-              <a:srgbClr val="7030A0"/>
+              <a:srgbClr val="660066"/>
             </a:solidFill>
           </a:ln>
         </p:spPr>
@@ -7042,13 +7122,73 @@
             <a:pPr algn="ctr"/>
             <a:r>
               <a:rPr lang="en-US" dirty="0" smtClean="0">
+                <a:latin typeface="Calibri (Corps)"/>
+                <a:cs typeface="Segoe UI Light" panose="020B0502040204020203" pitchFamily="34" charset="0"/>
+              </a:rPr>
+              <a:t>Booleans</a:t>
+            </a:r>
+            <a:endParaRPr lang="en-US" dirty="0">
+              <a:latin typeface="Calibri (Corps)"/>
+              <a:cs typeface="Segoe UI Light" panose="020B0502040204020203" pitchFamily="34" charset="0"/>
+            </a:endParaRPr>
+          </a:p>
+        </p:txBody>
+      </p:sp>
+      <p:sp>
+        <p:nvSpPr>
+          <p:cNvPr id="32" name="Rectangle 31"/>
+          <p:cNvSpPr/>
+          <p:nvPr/>
+        </p:nvSpPr>
+        <p:spPr>
+          <a:xfrm>
+            <a:off x="3394361" y="3340838"/>
+            <a:ext cx="2927929" cy="704692"/>
+          </a:xfrm>
+          <a:prstGeom prst="rect">
+            <a:avLst/>
+          </a:prstGeom>
+          <a:solidFill>
+            <a:srgbClr val="CC3399">
+              <a:alpha val="29020"/>
+            </a:srgbClr>
+          </a:solidFill>
+          <a:ln w="28575">
+            <a:solidFill>
+              <a:srgbClr val="7030A0"/>
+            </a:solidFill>
+          </a:ln>
+        </p:spPr>
+        <p:style>
+          <a:lnRef idx="2">
+            <a:schemeClr val="accent1">
+              <a:shade val="50000"/>
+            </a:schemeClr>
+          </a:lnRef>
+          <a:fillRef idx="1">
+            <a:schemeClr val="accent1"/>
+          </a:fillRef>
+          <a:effectRef idx="0">
+            <a:schemeClr val="accent1"/>
+          </a:effectRef>
+          <a:fontRef idx="minor">
+            <a:schemeClr val="lt1"/>
+          </a:fontRef>
+        </p:style>
+        <p:txBody>
+          <a:bodyPr rtlCol="0" anchor="ctr"/>
+          <a:lstStyle/>
+          <a:p>
+            <a:pPr algn="ctr"/>
+            <a:r>
+              <a:rPr lang="en-US" dirty="0" smtClean="0">
                 <a:solidFill>
                   <a:srgbClr val="7030A0"/>
                 </a:solidFill>
                 <a:latin typeface="Calibri (Corps)"/>
                 <a:cs typeface="Segoe UI Light" panose="020B0502040204020203" pitchFamily="34" charset="0"/>
               </a:rPr>
-              <a:t>‘Hi’, “Hi”, `Hi`</a:t>
+              <a:t>True/False</a:t>
             </a:r>
             <a:endParaRPr lang="en-US" dirty="0">
               <a:solidFill>
@@ -7062,13 +7202,13 @@
       </p:sp>
       <p:sp>
         <p:nvSpPr>
-          <p:cNvPr id="30" name="Rectangle 29"/>
+          <p:cNvPr id="33" name="Rectangle 32"/>
           <p:cNvSpPr/>
           <p:nvPr/>
         </p:nvSpPr>
         <p:spPr>
           <a:xfrm>
-            <a:off x="6816433" y="2177055"/>
+            <a:off x="6816433" y="3340838"/>
             <a:ext cx="4322620" cy="704692"/>
           </a:xfrm>
           <a:prstGeom prst="rect">
@@ -7105,7 +7245,6 @@
           <a:bodyPr rtlCol="0" anchor="ctr"/>
           <a:lstStyle/>
           <a:p>
-            <a:pPr algn="ctr"/>
             <a:r>
               <a:rPr lang="en-US" dirty="0" smtClean="0">
                 <a:solidFill>
@@ -7114,7 +7253,408 @@
                 <a:latin typeface="Calibri (Corps)"/>
                 <a:cs typeface="Segoe UI Light" panose="020B0502040204020203" pitchFamily="34" charset="0"/>
               </a:rPr>
-              <a:t>Important for outputting results, gathering input</a:t>
+              <a:t>Important for conditional code and situations where you only have 2 options</a:t>
+            </a:r>
+            <a:endParaRPr lang="en-US" dirty="0">
+              <a:solidFill>
+                <a:srgbClr val="7030A0"/>
+              </a:solidFill>
+              <a:latin typeface="Calibri (Corps)"/>
+              <a:cs typeface="Segoe UI Light" panose="020B0502040204020203" pitchFamily="34" charset="0"/>
+            </a:endParaRPr>
+          </a:p>
+        </p:txBody>
+      </p:sp>
+      <p:sp>
+        <p:nvSpPr>
+          <p:cNvPr id="34" name="Rectangle 33"/>
+          <p:cNvSpPr/>
+          <p:nvPr/>
+        </p:nvSpPr>
+        <p:spPr>
+          <a:xfrm>
+            <a:off x="429488" y="4504622"/>
+            <a:ext cx="2623129" cy="704693"/>
+          </a:xfrm>
+          <a:prstGeom prst="rect">
+            <a:avLst/>
+          </a:prstGeom>
+          <a:solidFill>
+            <a:srgbClr val="660066"/>
+          </a:solidFill>
+          <a:ln w="28575">
+            <a:solidFill>
+              <a:srgbClr val="660066"/>
+            </a:solidFill>
+          </a:ln>
+        </p:spPr>
+        <p:style>
+          <a:lnRef idx="2">
+            <a:schemeClr val="accent1">
+              <a:shade val="50000"/>
+            </a:schemeClr>
+          </a:lnRef>
+          <a:fillRef idx="1">
+            <a:schemeClr val="accent1"/>
+          </a:fillRef>
+          <a:effectRef idx="0">
+            <a:schemeClr val="accent1"/>
+          </a:effectRef>
+          <a:fontRef idx="minor">
+            <a:schemeClr val="lt1"/>
+          </a:fontRef>
+        </p:style>
+        <p:txBody>
+          <a:bodyPr rtlCol="0" anchor="ctr"/>
+          <a:lstStyle/>
+          <a:p>
+            <a:pPr algn="ctr"/>
+            <a:r>
+              <a:rPr lang="en-US" dirty="0" smtClean="0">
+                <a:latin typeface="Calibri (Corps)"/>
+                <a:cs typeface="Segoe UI Light" panose="020B0502040204020203" pitchFamily="34" charset="0"/>
+              </a:rPr>
+              <a:t>String (Text)</a:t>
+            </a:r>
+            <a:endParaRPr lang="en-US" dirty="0">
+              <a:latin typeface="Calibri (Corps)"/>
+              <a:cs typeface="Segoe UI Light" panose="020B0502040204020203" pitchFamily="34" charset="0"/>
+            </a:endParaRPr>
+          </a:p>
+        </p:txBody>
+      </p:sp>
+      <p:sp>
+        <p:nvSpPr>
+          <p:cNvPr id="35" name="Rectangle 34"/>
+          <p:cNvSpPr/>
+          <p:nvPr/>
+        </p:nvSpPr>
+        <p:spPr>
+          <a:xfrm>
+            <a:off x="3394361" y="4504621"/>
+            <a:ext cx="2927929" cy="704692"/>
+          </a:xfrm>
+          <a:prstGeom prst="rect">
+            <a:avLst/>
+          </a:prstGeom>
+          <a:solidFill>
+            <a:srgbClr val="CC3399">
+              <a:alpha val="29020"/>
+            </a:srgbClr>
+          </a:solidFill>
+          <a:ln w="28575">
+            <a:solidFill>
+              <a:srgbClr val="7030A0"/>
+            </a:solidFill>
+          </a:ln>
+        </p:spPr>
+        <p:style>
+          <a:lnRef idx="2">
+            <a:schemeClr val="accent1">
+              <a:shade val="50000"/>
+            </a:schemeClr>
+          </a:lnRef>
+          <a:fillRef idx="1">
+            <a:schemeClr val="accent1"/>
+          </a:fillRef>
+          <a:effectRef idx="0">
+            <a:schemeClr val="accent1"/>
+          </a:effectRef>
+          <a:fontRef idx="minor">
+            <a:schemeClr val="lt1"/>
+          </a:fontRef>
+        </p:style>
+        <p:txBody>
+          <a:bodyPr rtlCol="0" anchor="ctr"/>
+          <a:lstStyle/>
+          <a:p>
+            <a:pPr algn="ctr"/>
+            <a:r>
+              <a:rPr lang="en-US" dirty="0" smtClean="0">
+                <a:solidFill>
+                  <a:srgbClr val="7030A0"/>
+                </a:solidFill>
+                <a:latin typeface="Calibri (Corps)"/>
+                <a:cs typeface="Segoe UI Light" panose="020B0502040204020203" pitchFamily="34" charset="0"/>
+              </a:rPr>
+              <a:t>{ name : ‘Max’,</a:t>
+            </a:r>
+          </a:p>
+          <a:p>
+            <a:pPr algn="ctr"/>
+            <a:r>
+              <a:rPr lang="en-US" dirty="0" smtClean="0">
+                <a:solidFill>
+                  <a:srgbClr val="7030A0"/>
+                </a:solidFill>
+                <a:latin typeface="Calibri (Corps)"/>
+                <a:cs typeface="Segoe UI Light" panose="020B0502040204020203" pitchFamily="34" charset="0"/>
+              </a:rPr>
+              <a:t>Age: 31</a:t>
+            </a:r>
+            <a:r>
+              <a:rPr lang="en-US" dirty="0" smtClean="0">
+                <a:solidFill>
+                  <a:srgbClr val="7030A0"/>
+                </a:solidFill>
+                <a:latin typeface="Calibri (Corps)"/>
+                <a:cs typeface="Segoe UI Light" panose="020B0502040204020203" pitchFamily="34" charset="0"/>
+              </a:rPr>
+              <a:t>}</a:t>
+            </a:r>
+            <a:endParaRPr lang="en-US" dirty="0">
+              <a:solidFill>
+                <a:srgbClr val="7030A0"/>
+              </a:solidFill>
+              <a:latin typeface="Calibri (Corps)"/>
+              <a:cs typeface="Segoe UI Light" panose="020B0502040204020203" pitchFamily="34" charset="0"/>
+            </a:endParaRPr>
+          </a:p>
+        </p:txBody>
+      </p:sp>
+      <p:sp>
+        <p:nvSpPr>
+          <p:cNvPr id="36" name="Rectangle 35"/>
+          <p:cNvSpPr/>
+          <p:nvPr/>
+        </p:nvSpPr>
+        <p:spPr>
+          <a:xfrm>
+            <a:off x="6816433" y="4504621"/>
+            <a:ext cx="4322620" cy="704692"/>
+          </a:xfrm>
+          <a:prstGeom prst="rect">
+            <a:avLst/>
+          </a:prstGeom>
+          <a:solidFill>
+            <a:srgbClr val="CC3399">
+              <a:alpha val="29020"/>
+            </a:srgbClr>
+          </a:solidFill>
+          <a:ln w="28575">
+            <a:solidFill>
+              <a:srgbClr val="7030A0"/>
+            </a:solidFill>
+          </a:ln>
+        </p:spPr>
+        <p:style>
+          <a:lnRef idx="2">
+            <a:schemeClr val="accent1">
+              <a:shade val="50000"/>
+            </a:schemeClr>
+          </a:lnRef>
+          <a:fillRef idx="1">
+            <a:schemeClr val="accent1"/>
+          </a:fillRef>
+          <a:effectRef idx="0">
+            <a:schemeClr val="accent1"/>
+          </a:effectRef>
+          <a:fontRef idx="minor">
+            <a:schemeClr val="lt1"/>
+          </a:fontRef>
+        </p:style>
+        <p:txBody>
+          <a:bodyPr rtlCol="0" anchor="ctr"/>
+          <a:lstStyle/>
+          <a:p>
+            <a:r>
+              <a:rPr lang="en-US" dirty="0" smtClean="0">
+                <a:solidFill>
+                  <a:srgbClr val="7030A0"/>
+                </a:solidFill>
+                <a:latin typeface="Calibri (Corps)"/>
+                <a:cs typeface="Segoe UI Light" panose="020B0502040204020203" pitchFamily="34" charset="0"/>
+              </a:rPr>
+              <a:t>Important for grouped/ related data, helps you with organizing data.</a:t>
+            </a:r>
+            <a:endParaRPr lang="en-US" dirty="0">
+              <a:solidFill>
+                <a:srgbClr val="7030A0"/>
+              </a:solidFill>
+              <a:latin typeface="Calibri (Corps)"/>
+              <a:cs typeface="Segoe UI Light" panose="020B0502040204020203" pitchFamily="34" charset="0"/>
+            </a:endParaRPr>
+          </a:p>
+        </p:txBody>
+      </p:sp>
+      <p:sp>
+        <p:nvSpPr>
+          <p:cNvPr id="37" name="Rectangle 36"/>
+          <p:cNvSpPr/>
+          <p:nvPr/>
+        </p:nvSpPr>
+        <p:spPr>
+          <a:xfrm>
+            <a:off x="429488" y="5668406"/>
+            <a:ext cx="2623129" cy="704693"/>
+          </a:xfrm>
+          <a:prstGeom prst="rect">
+            <a:avLst/>
+          </a:prstGeom>
+          <a:solidFill>
+            <a:srgbClr val="660066"/>
+          </a:solidFill>
+          <a:ln w="28575">
+            <a:solidFill>
+              <a:srgbClr val="660066"/>
+            </a:solidFill>
+          </a:ln>
+        </p:spPr>
+        <p:style>
+          <a:lnRef idx="2">
+            <a:schemeClr val="accent1">
+              <a:shade val="50000"/>
+            </a:schemeClr>
+          </a:lnRef>
+          <a:fillRef idx="1">
+            <a:schemeClr val="accent1"/>
+          </a:fillRef>
+          <a:effectRef idx="0">
+            <a:schemeClr val="accent1"/>
+          </a:effectRef>
+          <a:fontRef idx="minor">
+            <a:schemeClr val="lt1"/>
+          </a:fontRef>
+        </p:style>
+        <p:txBody>
+          <a:bodyPr rtlCol="0" anchor="ctr"/>
+          <a:lstStyle/>
+          <a:p>
+            <a:pPr algn="ctr"/>
+            <a:r>
+              <a:rPr lang="en-US" dirty="0" smtClean="0">
+                <a:latin typeface="Calibri (Corps)"/>
+                <a:cs typeface="Segoe UI Light" panose="020B0502040204020203" pitchFamily="34" charset="0"/>
+              </a:rPr>
+              <a:t>Arrays</a:t>
+            </a:r>
+            <a:endParaRPr lang="en-US" dirty="0">
+              <a:latin typeface="Calibri (Corps)"/>
+              <a:cs typeface="Segoe UI Light" panose="020B0502040204020203" pitchFamily="34" charset="0"/>
+            </a:endParaRPr>
+          </a:p>
+        </p:txBody>
+      </p:sp>
+      <p:sp>
+        <p:nvSpPr>
+          <p:cNvPr id="38" name="Rectangle 37"/>
+          <p:cNvSpPr/>
+          <p:nvPr/>
+        </p:nvSpPr>
+        <p:spPr>
+          <a:xfrm>
+            <a:off x="3394361" y="5668407"/>
+            <a:ext cx="2927929" cy="704692"/>
+          </a:xfrm>
+          <a:prstGeom prst="rect">
+            <a:avLst/>
+          </a:prstGeom>
+          <a:solidFill>
+            <a:srgbClr val="CC3399">
+              <a:alpha val="29020"/>
+            </a:srgbClr>
+          </a:solidFill>
+          <a:ln w="28575">
+            <a:solidFill>
+              <a:srgbClr val="7030A0"/>
+            </a:solidFill>
+          </a:ln>
+        </p:spPr>
+        <p:style>
+          <a:lnRef idx="2">
+            <a:schemeClr val="accent1">
+              <a:shade val="50000"/>
+            </a:schemeClr>
+          </a:lnRef>
+          <a:fillRef idx="1">
+            <a:schemeClr val="accent1"/>
+          </a:fillRef>
+          <a:effectRef idx="0">
+            <a:schemeClr val="accent1"/>
+          </a:effectRef>
+          <a:fontRef idx="minor">
+            <a:schemeClr val="lt1"/>
+          </a:fontRef>
+        </p:style>
+        <p:txBody>
+          <a:bodyPr rtlCol="0" anchor="ctr"/>
+          <a:lstStyle/>
+          <a:p>
+            <a:pPr algn="ctr"/>
+            <a:r>
+              <a:rPr lang="en-US" dirty="0" smtClean="0">
+                <a:solidFill>
+                  <a:srgbClr val="7030A0"/>
+                </a:solidFill>
+                <a:latin typeface="Calibri (Corps)"/>
+                <a:cs typeface="Segoe UI Light" panose="020B0502040204020203" pitchFamily="34" charset="0"/>
+              </a:rPr>
+              <a:t>[1,3,5]</a:t>
+            </a:r>
+            <a:endParaRPr lang="en-US" dirty="0">
+              <a:solidFill>
+                <a:srgbClr val="7030A0"/>
+              </a:solidFill>
+              <a:latin typeface="Calibri (Corps)"/>
+              <a:cs typeface="Segoe UI Light" panose="020B0502040204020203" pitchFamily="34" charset="0"/>
+            </a:endParaRPr>
+          </a:p>
+        </p:txBody>
+      </p:sp>
+      <p:sp>
+        <p:nvSpPr>
+          <p:cNvPr id="39" name="Rectangle 38"/>
+          <p:cNvSpPr/>
+          <p:nvPr/>
+        </p:nvSpPr>
+        <p:spPr>
+          <a:xfrm>
+            <a:off x="6816433" y="5668407"/>
+            <a:ext cx="4322620" cy="704692"/>
+          </a:xfrm>
+          <a:prstGeom prst="rect">
+            <a:avLst/>
+          </a:prstGeom>
+          <a:solidFill>
+            <a:srgbClr val="CC3399">
+              <a:alpha val="29020"/>
+            </a:srgbClr>
+          </a:solidFill>
+          <a:ln w="28575">
+            <a:solidFill>
+              <a:srgbClr val="7030A0"/>
+            </a:solidFill>
+          </a:ln>
+        </p:spPr>
+        <p:style>
+          <a:lnRef idx="2">
+            <a:schemeClr val="accent1">
+              <a:shade val="50000"/>
+            </a:schemeClr>
+          </a:lnRef>
+          <a:fillRef idx="1">
+            <a:schemeClr val="accent1"/>
+          </a:fillRef>
+          <a:effectRef idx="0">
+            <a:schemeClr val="accent1"/>
+          </a:effectRef>
+          <a:fontRef idx="minor">
+            <a:schemeClr val="lt1"/>
+          </a:fontRef>
+        </p:style>
+        <p:txBody>
+          <a:bodyPr rtlCol="0" anchor="ctr"/>
+          <a:lstStyle/>
+          <a:p>
+            <a:r>
+              <a:rPr lang="en-US" dirty="0" smtClean="0">
+                <a:solidFill>
+                  <a:srgbClr val="7030A0"/>
+                </a:solidFill>
+                <a:latin typeface="Calibri (Corps)"/>
+                <a:cs typeface="Segoe UI Light" panose="020B0502040204020203" pitchFamily="34" charset="0"/>
+              </a:rPr>
+              <a:t>Important for list data, unknown amounts of data</a:t>
             </a:r>
             <a:endParaRPr lang="en-US" dirty="0">
               <a:solidFill>
@@ -7136,6 +7676,13 @@
   <p:clrMapOvr>
     <a:masterClrMapping/>
   </p:clrMapOvr>
+  <p:timing>
+    <p:tnLst>
+      <p:par>
+        <p:cTn id="1" dur="indefinite" restart="never" nodeType="tmRoot"/>
+      </p:par>
+    </p:tnLst>
+  </p:timing>
 </p:sld>
 </file>
 
@@ -7719,6 +8266,13 @@
   <p:clrMapOvr>
     <a:masterClrMapping/>
   </p:clrMapOvr>
+  <p:timing>
+    <p:tnLst>
+      <p:par>
+        <p:cTn id="1" dur="indefinite" restart="never" nodeType="tmRoot"/>
+      </p:par>
+    </p:tnLst>
+  </p:timing>
 </p:sld>
 </file>
 

</xml_diff>

<commit_message>
40. undefined, null & NaN
</commit_message>
<xml_diff>
--- a/2. Basics Variables, Data Types, Operators & Functions/docs/Introduction.pptx
+++ b/2. Basics Variables, Data Types, Operators & Functions/docs/Introduction.pptx
@@ -13,6 +13,7 @@
     <p:sldId id="262" r:id="rId7"/>
     <p:sldId id="263" r:id="rId8"/>
     <p:sldId id="264" r:id="rId9"/>
+    <p:sldId id="265" r:id="rId10"/>
   </p:sldIdLst>
   <p:sldSz cx="12192000" cy="6858000"/>
   <p:notesSz cx="6858000" cy="9144000"/>
@@ -8947,6 +8948,870 @@
     <p:extLst>
       <p:ext uri="{BB962C8B-B14F-4D97-AF65-F5344CB8AC3E}">
         <p14:creationId xmlns:p14="http://schemas.microsoft.com/office/powerpoint/2010/main" val="1143210552"/>
+      </p:ext>
+    </p:extLst>
+  </p:cSld>
+  <p:clrMapOvr>
+    <a:masterClrMapping/>
+  </p:clrMapOvr>
+</p:sld>
+</file>
+
+<file path=ppt/slides/slide9.xml><?xml version="1.0" encoding="utf-8"?>
+<p:sld xmlns:a="http://schemas.openxmlformats.org/drawingml/2006/main" xmlns:r="http://schemas.openxmlformats.org/officeDocument/2006/relationships" xmlns:p="http://schemas.openxmlformats.org/presentationml/2006/main">
+  <p:cSld>
+    <p:spTree>
+      <p:nvGrpSpPr>
+        <p:cNvPr id="1" name=""/>
+        <p:cNvGrpSpPr/>
+        <p:nvPr/>
+      </p:nvGrpSpPr>
+      <p:grpSpPr>
+        <a:xfrm>
+          <a:off x="0" y="0"/>
+          <a:ext cx="0" cy="0"/>
+          <a:chOff x="0" y="0"/>
+          <a:chExt cx="0" cy="0"/>
+        </a:xfrm>
+      </p:grpSpPr>
+      <p:sp>
+        <p:nvSpPr>
+          <p:cNvPr id="4" name="ZoneTexte 3"/>
+          <p:cNvSpPr txBox="1"/>
+          <p:nvPr/>
+        </p:nvSpPr>
+        <p:spPr>
+          <a:xfrm>
+            <a:off x="489527" y="193964"/>
+            <a:ext cx="4368799" cy="523220"/>
+          </a:xfrm>
+          <a:prstGeom prst="rect">
+            <a:avLst/>
+          </a:prstGeom>
+          <a:noFill/>
+        </p:spPr>
+        <p:txBody>
+          <a:bodyPr wrap="square" rtlCol="0">
+            <a:spAutoFit/>
+          </a:bodyPr>
+          <a:lstStyle/>
+          <a:p>
+            <a:r>
+              <a:rPr lang="en-US" sz="2800" b="1" dirty="0" smtClean="0">
+                <a:ea typeface="Segoe UI Black" panose="020B0A02040204020203" pitchFamily="34" charset="0"/>
+                <a:cs typeface="Segoe UI Semibold" panose="020B0702040204020203" pitchFamily="34" charset="0"/>
+              </a:rPr>
+              <a:t>Null/undefined/</a:t>
+            </a:r>
+            <a:r>
+              <a:rPr lang="en-US" sz="2800" b="1" dirty="0" err="1" smtClean="0">
+                <a:ea typeface="Segoe UI Black" panose="020B0A02040204020203" pitchFamily="34" charset="0"/>
+                <a:cs typeface="Segoe UI Semibold" panose="020B0702040204020203" pitchFamily="34" charset="0"/>
+              </a:rPr>
+              <a:t>NaN</a:t>
+            </a:r>
+            <a:endParaRPr lang="en-US" sz="2800" b="1" dirty="0">
+              <a:ea typeface="Segoe UI Black" panose="020B0A02040204020203" pitchFamily="34" charset="0"/>
+              <a:cs typeface="Segoe UI Semibold" panose="020B0702040204020203" pitchFamily="34" charset="0"/>
+            </a:endParaRPr>
+          </a:p>
+        </p:txBody>
+      </p:sp>
+      <p:sp>
+        <p:nvSpPr>
+          <p:cNvPr id="5" name="Rectangle 4"/>
+          <p:cNvSpPr/>
+          <p:nvPr/>
+        </p:nvSpPr>
+        <p:spPr>
+          <a:xfrm>
+            <a:off x="489527" y="2078180"/>
+            <a:ext cx="2854037" cy="748145"/>
+          </a:xfrm>
+          <a:prstGeom prst="rect">
+            <a:avLst/>
+          </a:prstGeom>
+          <a:solidFill>
+            <a:srgbClr val="660066"/>
+          </a:solidFill>
+          <a:ln>
+            <a:noFill/>
+          </a:ln>
+        </p:spPr>
+        <p:style>
+          <a:lnRef idx="2">
+            <a:schemeClr val="accent1">
+              <a:shade val="50000"/>
+            </a:schemeClr>
+          </a:lnRef>
+          <a:fillRef idx="1">
+            <a:schemeClr val="accent1"/>
+          </a:fillRef>
+          <a:effectRef idx="0">
+            <a:schemeClr val="accent1"/>
+          </a:effectRef>
+          <a:fontRef idx="minor">
+            <a:schemeClr val="lt1"/>
+          </a:fontRef>
+        </p:style>
+        <p:txBody>
+          <a:bodyPr rtlCol="0" anchor="ctr"/>
+          <a:lstStyle/>
+          <a:p>
+            <a:pPr algn="ctr"/>
+            <a:r>
+              <a:rPr lang="en-US" dirty="0" smtClean="0">
+                <a:latin typeface="Calibri (Corps)"/>
+                <a:cs typeface="Segoe UI Light" panose="020B0502040204020203" pitchFamily="34" charset="0"/>
+              </a:rPr>
+              <a:t>undefined</a:t>
+            </a:r>
+            <a:endParaRPr lang="en-US" dirty="0">
+              <a:latin typeface="Calibri (Corps)"/>
+              <a:cs typeface="Segoe UI Light" panose="020B0502040204020203" pitchFamily="34" charset="0"/>
+            </a:endParaRPr>
+          </a:p>
+        </p:txBody>
+      </p:sp>
+      <p:sp>
+        <p:nvSpPr>
+          <p:cNvPr id="6" name="Rectangle 5"/>
+          <p:cNvSpPr/>
+          <p:nvPr/>
+        </p:nvSpPr>
+        <p:spPr>
+          <a:xfrm>
+            <a:off x="489526" y="2939617"/>
+            <a:ext cx="2854037" cy="1068966"/>
+          </a:xfrm>
+          <a:prstGeom prst="rect">
+            <a:avLst/>
+          </a:prstGeom>
+          <a:solidFill>
+            <a:srgbClr val="CC3399">
+              <a:alpha val="29020"/>
+            </a:srgbClr>
+          </a:solidFill>
+          <a:ln w="28575">
+            <a:solidFill>
+              <a:srgbClr val="7030A0"/>
+            </a:solidFill>
+          </a:ln>
+        </p:spPr>
+        <p:style>
+          <a:lnRef idx="2">
+            <a:schemeClr val="accent1">
+              <a:shade val="50000"/>
+            </a:schemeClr>
+          </a:lnRef>
+          <a:fillRef idx="1">
+            <a:schemeClr val="accent1"/>
+          </a:fillRef>
+          <a:effectRef idx="0">
+            <a:schemeClr val="accent1"/>
+          </a:effectRef>
+          <a:fontRef idx="minor">
+            <a:schemeClr val="lt1"/>
+          </a:fontRef>
+        </p:style>
+        <p:txBody>
+          <a:bodyPr rtlCol="0" anchor="ctr"/>
+          <a:lstStyle/>
+          <a:p>
+            <a:pPr algn="ctr">
+              <a:lnSpc>
+                <a:spcPct val="150000"/>
+              </a:lnSpc>
+            </a:pPr>
+            <a:r>
+              <a:rPr lang="en-US" dirty="0" smtClean="0">
+                <a:solidFill>
+                  <a:srgbClr val="7030A0"/>
+                </a:solidFill>
+                <a:latin typeface="Calibri (Corps)"/>
+                <a:cs typeface="Segoe UI Light" panose="020B0502040204020203" pitchFamily="34" charset="0"/>
+              </a:rPr>
+              <a:t>Default value of uninitialized variables</a:t>
+            </a:r>
+            <a:endParaRPr lang="en-US" dirty="0">
+              <a:solidFill>
+                <a:srgbClr val="7030A0"/>
+              </a:solidFill>
+              <a:latin typeface="Calibri (Corps)"/>
+              <a:cs typeface="Segoe UI Light" panose="020B0502040204020203" pitchFamily="34" charset="0"/>
+            </a:endParaRPr>
+          </a:p>
+        </p:txBody>
+      </p:sp>
+      <p:sp>
+        <p:nvSpPr>
+          <p:cNvPr id="7" name="Rectangle 6"/>
+          <p:cNvSpPr/>
+          <p:nvPr/>
+        </p:nvSpPr>
+        <p:spPr>
+          <a:xfrm>
+            <a:off x="3581398" y="925686"/>
+            <a:ext cx="4371110" cy="679367"/>
+          </a:xfrm>
+          <a:prstGeom prst="rect">
+            <a:avLst/>
+          </a:prstGeom>
+          <a:solidFill>
+            <a:srgbClr val="FFFF00"/>
+          </a:solidFill>
+          <a:ln w="19050">
+            <a:solidFill>
+              <a:schemeClr val="tx1"/>
+            </a:solidFill>
+          </a:ln>
+        </p:spPr>
+        <p:style>
+          <a:lnRef idx="2">
+            <a:schemeClr val="accent1">
+              <a:shade val="50000"/>
+            </a:schemeClr>
+          </a:lnRef>
+          <a:fillRef idx="1">
+            <a:schemeClr val="accent1"/>
+          </a:fillRef>
+          <a:effectRef idx="0">
+            <a:schemeClr val="accent1"/>
+          </a:effectRef>
+          <a:fontRef idx="minor">
+            <a:schemeClr val="lt1"/>
+          </a:fontRef>
+        </p:style>
+        <p:txBody>
+          <a:bodyPr rtlCol="0" anchor="ctr"/>
+          <a:lstStyle/>
+          <a:p>
+            <a:pPr algn="ctr"/>
+            <a:r>
+              <a:rPr lang="en-US" sz="2400" dirty="0" smtClean="0">
+                <a:solidFill>
+                  <a:schemeClr val="tx1"/>
+                </a:solidFill>
+              </a:rPr>
+              <a:t>Special Values</a:t>
+            </a:r>
+            <a:endParaRPr lang="en-US" sz="2400" dirty="0">
+              <a:solidFill>
+                <a:schemeClr val="tx1"/>
+              </a:solidFill>
+            </a:endParaRPr>
+          </a:p>
+        </p:txBody>
+      </p:sp>
+      <p:sp>
+        <p:nvSpPr>
+          <p:cNvPr id="8" name="Rectangle 7"/>
+          <p:cNvSpPr/>
+          <p:nvPr/>
+        </p:nvSpPr>
+        <p:spPr>
+          <a:xfrm>
+            <a:off x="489525" y="4187321"/>
+            <a:ext cx="2854037" cy="1262134"/>
+          </a:xfrm>
+          <a:prstGeom prst="rect">
+            <a:avLst/>
+          </a:prstGeom>
+          <a:solidFill>
+            <a:srgbClr val="CC3399">
+              <a:alpha val="29020"/>
+            </a:srgbClr>
+          </a:solidFill>
+          <a:ln w="28575">
+            <a:solidFill>
+              <a:srgbClr val="7030A0"/>
+            </a:solidFill>
+          </a:ln>
+        </p:spPr>
+        <p:style>
+          <a:lnRef idx="2">
+            <a:schemeClr val="accent1">
+              <a:shade val="50000"/>
+            </a:schemeClr>
+          </a:lnRef>
+          <a:fillRef idx="1">
+            <a:schemeClr val="accent1"/>
+          </a:fillRef>
+          <a:effectRef idx="0">
+            <a:schemeClr val="accent1"/>
+          </a:effectRef>
+          <a:fontRef idx="minor">
+            <a:schemeClr val="lt1"/>
+          </a:fontRef>
+        </p:style>
+        <p:txBody>
+          <a:bodyPr rtlCol="0" anchor="ctr"/>
+          <a:lstStyle/>
+          <a:p>
+            <a:pPr algn="ctr">
+              <a:lnSpc>
+                <a:spcPct val="150000"/>
+              </a:lnSpc>
+            </a:pPr>
+            <a:r>
+              <a:rPr lang="en-US" dirty="0" smtClean="0">
+                <a:solidFill>
+                  <a:srgbClr val="7030A0"/>
+                </a:solidFill>
+                <a:latin typeface="Calibri (Corps)"/>
+                <a:cs typeface="Segoe UI Light" panose="020B0502040204020203" pitchFamily="34" charset="0"/>
+              </a:rPr>
+              <a:t>You shouldn’t assign undefined as a value manually</a:t>
+            </a:r>
+            <a:endParaRPr lang="en-US" dirty="0">
+              <a:solidFill>
+                <a:srgbClr val="7030A0"/>
+              </a:solidFill>
+              <a:latin typeface="Calibri (Corps)"/>
+              <a:cs typeface="Segoe UI Light" panose="020B0502040204020203" pitchFamily="34" charset="0"/>
+            </a:endParaRPr>
+          </a:p>
+        </p:txBody>
+      </p:sp>
+      <p:sp>
+        <p:nvSpPr>
+          <p:cNvPr id="9" name="Rectangle 8"/>
+          <p:cNvSpPr/>
+          <p:nvPr/>
+        </p:nvSpPr>
+        <p:spPr>
+          <a:xfrm>
+            <a:off x="4262581" y="2078180"/>
+            <a:ext cx="2854037" cy="748145"/>
+          </a:xfrm>
+          <a:prstGeom prst="rect">
+            <a:avLst/>
+          </a:prstGeom>
+          <a:solidFill>
+            <a:srgbClr val="660066"/>
+          </a:solidFill>
+          <a:ln>
+            <a:noFill/>
+          </a:ln>
+        </p:spPr>
+        <p:style>
+          <a:lnRef idx="2">
+            <a:schemeClr val="accent1">
+              <a:shade val="50000"/>
+            </a:schemeClr>
+          </a:lnRef>
+          <a:fillRef idx="1">
+            <a:schemeClr val="accent1"/>
+          </a:fillRef>
+          <a:effectRef idx="0">
+            <a:schemeClr val="accent1"/>
+          </a:effectRef>
+          <a:fontRef idx="minor">
+            <a:schemeClr val="lt1"/>
+          </a:fontRef>
+        </p:style>
+        <p:txBody>
+          <a:bodyPr rtlCol="0" anchor="ctr"/>
+          <a:lstStyle/>
+          <a:p>
+            <a:pPr algn="ctr"/>
+            <a:r>
+              <a:rPr lang="en-US" dirty="0" smtClean="0">
+                <a:latin typeface="Calibri (Corps)"/>
+                <a:cs typeface="Segoe UI Light" panose="020B0502040204020203" pitchFamily="34" charset="0"/>
+              </a:rPr>
+              <a:t>null</a:t>
+            </a:r>
+            <a:endParaRPr lang="en-US" dirty="0">
+              <a:latin typeface="Calibri (Corps)"/>
+              <a:cs typeface="Segoe UI Light" panose="020B0502040204020203" pitchFamily="34" charset="0"/>
+            </a:endParaRPr>
+          </a:p>
+        </p:txBody>
+      </p:sp>
+      <p:sp>
+        <p:nvSpPr>
+          <p:cNvPr id="10" name="Rectangle 9"/>
+          <p:cNvSpPr/>
+          <p:nvPr/>
+        </p:nvSpPr>
+        <p:spPr>
+          <a:xfrm>
+            <a:off x="4262580" y="2939617"/>
+            <a:ext cx="2854037" cy="1068966"/>
+          </a:xfrm>
+          <a:prstGeom prst="rect">
+            <a:avLst/>
+          </a:prstGeom>
+          <a:solidFill>
+            <a:srgbClr val="CC3399">
+              <a:alpha val="29020"/>
+            </a:srgbClr>
+          </a:solidFill>
+          <a:ln w="28575">
+            <a:solidFill>
+              <a:srgbClr val="7030A0"/>
+            </a:solidFill>
+          </a:ln>
+        </p:spPr>
+        <p:style>
+          <a:lnRef idx="2">
+            <a:schemeClr val="accent1">
+              <a:shade val="50000"/>
+            </a:schemeClr>
+          </a:lnRef>
+          <a:fillRef idx="1">
+            <a:schemeClr val="accent1"/>
+          </a:fillRef>
+          <a:effectRef idx="0">
+            <a:schemeClr val="accent1"/>
+          </a:effectRef>
+          <a:fontRef idx="minor">
+            <a:schemeClr val="lt1"/>
+          </a:fontRef>
+        </p:style>
+        <p:txBody>
+          <a:bodyPr rtlCol="0" anchor="ctr"/>
+          <a:lstStyle/>
+          <a:p>
+            <a:pPr algn="ctr">
+              <a:lnSpc>
+                <a:spcPct val="150000"/>
+              </a:lnSpc>
+            </a:pPr>
+            <a:r>
+              <a:rPr lang="en-US" dirty="0" smtClean="0">
+                <a:solidFill>
+                  <a:srgbClr val="7030A0"/>
+                </a:solidFill>
+                <a:latin typeface="Calibri (Corps)"/>
+                <a:cs typeface="Segoe UI Light" panose="020B0502040204020203" pitchFamily="34" charset="0"/>
+              </a:rPr>
+              <a:t>Never assumed by default</a:t>
+            </a:r>
+            <a:endParaRPr lang="en-US" dirty="0">
+              <a:solidFill>
+                <a:srgbClr val="7030A0"/>
+              </a:solidFill>
+              <a:latin typeface="Calibri (Corps)"/>
+              <a:cs typeface="Segoe UI Light" panose="020B0502040204020203" pitchFamily="34" charset="0"/>
+            </a:endParaRPr>
+          </a:p>
+        </p:txBody>
+      </p:sp>
+      <p:sp>
+        <p:nvSpPr>
+          <p:cNvPr id="11" name="Rectangle 10"/>
+          <p:cNvSpPr/>
+          <p:nvPr/>
+        </p:nvSpPr>
+        <p:spPr>
+          <a:xfrm>
+            <a:off x="4262580" y="4187321"/>
+            <a:ext cx="2854037" cy="1262134"/>
+          </a:xfrm>
+          <a:prstGeom prst="rect">
+            <a:avLst/>
+          </a:prstGeom>
+          <a:solidFill>
+            <a:srgbClr val="CC3399">
+              <a:alpha val="29020"/>
+            </a:srgbClr>
+          </a:solidFill>
+          <a:ln w="28575">
+            <a:solidFill>
+              <a:srgbClr val="7030A0"/>
+            </a:solidFill>
+          </a:ln>
+        </p:spPr>
+        <p:style>
+          <a:lnRef idx="2">
+            <a:schemeClr val="accent1">
+              <a:shade val="50000"/>
+            </a:schemeClr>
+          </a:lnRef>
+          <a:fillRef idx="1">
+            <a:schemeClr val="accent1"/>
+          </a:fillRef>
+          <a:effectRef idx="0">
+            <a:schemeClr val="accent1"/>
+          </a:effectRef>
+          <a:fontRef idx="minor">
+            <a:schemeClr val="lt1"/>
+          </a:fontRef>
+        </p:style>
+        <p:txBody>
+          <a:bodyPr rtlCol="0" anchor="ctr"/>
+          <a:lstStyle/>
+          <a:p>
+            <a:pPr algn="ctr">
+              <a:lnSpc>
+                <a:spcPct val="150000"/>
+              </a:lnSpc>
+            </a:pPr>
+            <a:r>
+              <a:rPr lang="en-US" dirty="0" smtClean="0">
+                <a:solidFill>
+                  <a:srgbClr val="7030A0"/>
+                </a:solidFill>
+                <a:latin typeface="Calibri (Corps)"/>
+                <a:cs typeface="Segoe UI Light" panose="020B0502040204020203" pitchFamily="34" charset="0"/>
+              </a:rPr>
+              <a:t>You can assign this is a value if you want to “reset” / “clear” a variable</a:t>
+            </a:r>
+            <a:endParaRPr lang="en-US" dirty="0">
+              <a:solidFill>
+                <a:srgbClr val="7030A0"/>
+              </a:solidFill>
+              <a:latin typeface="Calibri (Corps)"/>
+              <a:cs typeface="Segoe UI Light" panose="020B0502040204020203" pitchFamily="34" charset="0"/>
+            </a:endParaRPr>
+          </a:p>
+        </p:txBody>
+      </p:sp>
+      <p:sp>
+        <p:nvSpPr>
+          <p:cNvPr id="12" name="Rectangle 11"/>
+          <p:cNvSpPr/>
+          <p:nvPr/>
+        </p:nvSpPr>
+        <p:spPr>
+          <a:xfrm>
+            <a:off x="489524" y="5595866"/>
+            <a:ext cx="6627093" cy="635150"/>
+          </a:xfrm>
+          <a:prstGeom prst="rect">
+            <a:avLst/>
+          </a:prstGeom>
+          <a:solidFill>
+            <a:srgbClr val="CC3399">
+              <a:alpha val="29020"/>
+            </a:srgbClr>
+          </a:solidFill>
+          <a:ln w="28575">
+            <a:solidFill>
+              <a:srgbClr val="7030A0"/>
+            </a:solidFill>
+          </a:ln>
+        </p:spPr>
+        <p:style>
+          <a:lnRef idx="2">
+            <a:schemeClr val="accent1">
+              <a:shade val="50000"/>
+            </a:schemeClr>
+          </a:lnRef>
+          <a:fillRef idx="1">
+            <a:schemeClr val="accent1"/>
+          </a:fillRef>
+          <a:effectRef idx="0">
+            <a:schemeClr val="accent1"/>
+          </a:effectRef>
+          <a:fontRef idx="minor">
+            <a:schemeClr val="lt1"/>
+          </a:fontRef>
+        </p:style>
+        <p:txBody>
+          <a:bodyPr rtlCol="0" anchor="ctr"/>
+          <a:lstStyle/>
+          <a:p>
+            <a:pPr algn="ctr">
+              <a:lnSpc>
+                <a:spcPct val="150000"/>
+              </a:lnSpc>
+            </a:pPr>
+            <a:r>
+              <a:rPr lang="en-US" dirty="0" smtClean="0">
+                <a:solidFill>
+                  <a:srgbClr val="7030A0"/>
+                </a:solidFill>
+                <a:latin typeface="Calibri (Corps)"/>
+                <a:cs typeface="Segoe UI Light" panose="020B0502040204020203" pitchFamily="34" charset="0"/>
+              </a:rPr>
+              <a:t>NOT entirely equal!</a:t>
+            </a:r>
+            <a:endParaRPr lang="en-US" dirty="0">
+              <a:solidFill>
+                <a:srgbClr val="7030A0"/>
+              </a:solidFill>
+              <a:latin typeface="Calibri (Corps)"/>
+              <a:cs typeface="Segoe UI Light" panose="020B0502040204020203" pitchFamily="34" charset="0"/>
+            </a:endParaRPr>
+          </a:p>
+        </p:txBody>
+      </p:sp>
+      <p:sp>
+        <p:nvSpPr>
+          <p:cNvPr id="14" name="Rectangle 13"/>
+          <p:cNvSpPr/>
+          <p:nvPr/>
+        </p:nvSpPr>
+        <p:spPr>
+          <a:xfrm>
+            <a:off x="8035635" y="2078180"/>
+            <a:ext cx="2854037" cy="748145"/>
+          </a:xfrm>
+          <a:prstGeom prst="rect">
+            <a:avLst/>
+          </a:prstGeom>
+          <a:noFill/>
+          <a:ln w="28575">
+            <a:solidFill>
+              <a:srgbClr val="7030A0"/>
+            </a:solidFill>
+            <a:prstDash val="sysDash"/>
+          </a:ln>
+        </p:spPr>
+        <p:style>
+          <a:lnRef idx="2">
+            <a:schemeClr val="accent1">
+              <a:shade val="50000"/>
+            </a:schemeClr>
+          </a:lnRef>
+          <a:fillRef idx="1">
+            <a:schemeClr val="accent1"/>
+          </a:fillRef>
+          <a:effectRef idx="0">
+            <a:schemeClr val="accent1"/>
+          </a:effectRef>
+          <a:fontRef idx="minor">
+            <a:schemeClr val="lt1"/>
+          </a:fontRef>
+        </p:style>
+        <p:txBody>
+          <a:bodyPr rtlCol="0" anchor="ctr"/>
+          <a:lstStyle/>
+          <a:p>
+            <a:pPr algn="ctr"/>
+            <a:r>
+              <a:rPr lang="en-US" dirty="0" err="1" smtClean="0">
+                <a:solidFill>
+                  <a:srgbClr val="7030A0"/>
+                </a:solidFill>
+                <a:latin typeface="Calibri (Corps)"/>
+                <a:cs typeface="Segoe UI Light" panose="020B0502040204020203" pitchFamily="34" charset="0"/>
+              </a:rPr>
+              <a:t>NaN</a:t>
+            </a:r>
+            <a:endParaRPr lang="en-US" dirty="0">
+              <a:solidFill>
+                <a:srgbClr val="7030A0"/>
+              </a:solidFill>
+              <a:latin typeface="Calibri (Corps)"/>
+              <a:cs typeface="Segoe UI Light" panose="020B0502040204020203" pitchFamily="34" charset="0"/>
+            </a:endParaRPr>
+          </a:p>
+        </p:txBody>
+      </p:sp>
+      <p:sp>
+        <p:nvSpPr>
+          <p:cNvPr id="15" name="Rectangle 14"/>
+          <p:cNvSpPr/>
+          <p:nvPr/>
+        </p:nvSpPr>
+        <p:spPr>
+          <a:xfrm>
+            <a:off x="8035634" y="3034975"/>
+            <a:ext cx="2854038" cy="973608"/>
+          </a:xfrm>
+          <a:prstGeom prst="rect">
+            <a:avLst/>
+          </a:prstGeom>
+          <a:noFill/>
+          <a:ln w="28575">
+            <a:solidFill>
+              <a:srgbClr val="7030A0"/>
+            </a:solidFill>
+            <a:prstDash val="sysDash"/>
+          </a:ln>
+        </p:spPr>
+        <p:style>
+          <a:lnRef idx="2">
+            <a:schemeClr val="accent1">
+              <a:shade val="50000"/>
+            </a:schemeClr>
+          </a:lnRef>
+          <a:fillRef idx="1">
+            <a:schemeClr val="accent1"/>
+          </a:fillRef>
+          <a:effectRef idx="0">
+            <a:schemeClr val="accent1"/>
+          </a:effectRef>
+          <a:fontRef idx="minor">
+            <a:schemeClr val="lt1"/>
+          </a:fontRef>
+        </p:style>
+        <p:txBody>
+          <a:bodyPr rtlCol="0" anchor="ctr"/>
+          <a:lstStyle/>
+          <a:p>
+            <a:pPr algn="ctr"/>
+            <a:r>
+              <a:rPr lang="en-US" dirty="0" smtClean="0">
+                <a:solidFill>
+                  <a:srgbClr val="7030A0"/>
+                </a:solidFill>
+                <a:latin typeface="Calibri (Corps)"/>
+                <a:cs typeface="Segoe UI Light" panose="020B0502040204020203" pitchFamily="34" charset="0"/>
+              </a:rPr>
+              <a:t>Technically, it’s of type number and can therefore be used in calculations</a:t>
+            </a:r>
+            <a:endParaRPr lang="en-US" dirty="0">
+              <a:solidFill>
+                <a:srgbClr val="7030A0"/>
+              </a:solidFill>
+              <a:latin typeface="Calibri (Corps)"/>
+              <a:cs typeface="Segoe UI Light" panose="020B0502040204020203" pitchFamily="34" charset="0"/>
+            </a:endParaRPr>
+          </a:p>
+        </p:txBody>
+      </p:sp>
+      <p:sp>
+        <p:nvSpPr>
+          <p:cNvPr id="16" name="Rectangle 15"/>
+          <p:cNvSpPr/>
+          <p:nvPr/>
+        </p:nvSpPr>
+        <p:spPr>
+          <a:xfrm rot="949207">
+            <a:off x="10359605" y="1828618"/>
+            <a:ext cx="1643078" cy="499123"/>
+          </a:xfrm>
+          <a:prstGeom prst="rect">
+            <a:avLst/>
+          </a:prstGeom>
+          <a:solidFill>
+            <a:srgbClr val="FFFF00"/>
+          </a:solidFill>
+          <a:ln w="19050">
+            <a:solidFill>
+              <a:schemeClr val="tx1"/>
+            </a:solidFill>
+          </a:ln>
+        </p:spPr>
+        <p:style>
+          <a:lnRef idx="2">
+            <a:schemeClr val="accent1">
+              <a:shade val="50000"/>
+            </a:schemeClr>
+          </a:lnRef>
+          <a:fillRef idx="1">
+            <a:schemeClr val="accent1"/>
+          </a:fillRef>
+          <a:effectRef idx="0">
+            <a:schemeClr val="accent1"/>
+          </a:effectRef>
+          <a:fontRef idx="minor">
+            <a:schemeClr val="lt1"/>
+          </a:fontRef>
+        </p:style>
+        <p:txBody>
+          <a:bodyPr rtlCol="0" anchor="ctr"/>
+          <a:lstStyle/>
+          <a:p>
+            <a:pPr algn="ctr"/>
+            <a:r>
+              <a:rPr lang="en-US" sz="2000" dirty="0" smtClean="0">
+                <a:solidFill>
+                  <a:schemeClr val="tx1"/>
+                </a:solidFill>
+              </a:rPr>
+              <a:t>Not a type!</a:t>
+            </a:r>
+            <a:endParaRPr lang="en-US" sz="2000" dirty="0">
+              <a:solidFill>
+                <a:schemeClr val="tx1"/>
+              </a:solidFill>
+            </a:endParaRPr>
+          </a:p>
+        </p:txBody>
+      </p:sp>
+      <p:sp>
+        <p:nvSpPr>
+          <p:cNvPr id="17" name="Rectangle 16"/>
+          <p:cNvSpPr/>
+          <p:nvPr/>
+        </p:nvSpPr>
+        <p:spPr>
+          <a:xfrm>
+            <a:off x="8035634" y="4187321"/>
+            <a:ext cx="2854038" cy="1262134"/>
+          </a:xfrm>
+          <a:prstGeom prst="rect">
+            <a:avLst/>
+          </a:prstGeom>
+          <a:noFill/>
+          <a:ln w="28575">
+            <a:solidFill>
+              <a:srgbClr val="7030A0"/>
+            </a:solidFill>
+            <a:prstDash val="sysDash"/>
+          </a:ln>
+        </p:spPr>
+        <p:style>
+          <a:lnRef idx="2">
+            <a:schemeClr val="accent1">
+              <a:shade val="50000"/>
+            </a:schemeClr>
+          </a:lnRef>
+          <a:fillRef idx="1">
+            <a:schemeClr val="accent1"/>
+          </a:fillRef>
+          <a:effectRef idx="0">
+            <a:schemeClr val="accent1"/>
+          </a:effectRef>
+          <a:fontRef idx="minor">
+            <a:schemeClr val="lt1"/>
+          </a:fontRef>
+        </p:style>
+        <p:txBody>
+          <a:bodyPr rtlCol="0" anchor="ctr"/>
+          <a:lstStyle/>
+          <a:p>
+            <a:pPr algn="ctr"/>
+            <a:r>
+              <a:rPr lang="en-US" dirty="0" smtClean="0">
+                <a:solidFill>
+                  <a:srgbClr val="7030A0"/>
+                </a:solidFill>
+                <a:latin typeface="Calibri (Corps)"/>
+                <a:cs typeface="Segoe UI Light" panose="020B0502040204020203" pitchFamily="34" charset="0"/>
+              </a:rPr>
+              <a:t>It yields a new </a:t>
+            </a:r>
+            <a:r>
+              <a:rPr lang="en-US" dirty="0" err="1" smtClean="0">
+                <a:solidFill>
+                  <a:srgbClr val="7030A0"/>
+                </a:solidFill>
+                <a:latin typeface="Calibri (Corps)"/>
+                <a:cs typeface="Segoe UI Light" panose="020B0502040204020203" pitchFamily="34" charset="0"/>
+              </a:rPr>
+              <a:t>NaN</a:t>
+            </a:r>
+            <a:r>
+              <a:rPr lang="en-US" dirty="0" smtClean="0">
+                <a:solidFill>
+                  <a:srgbClr val="7030A0"/>
+                </a:solidFill>
+                <a:latin typeface="Calibri (Corps)"/>
+                <a:cs typeface="Segoe UI Light" panose="020B0502040204020203" pitchFamily="34" charset="0"/>
+              </a:rPr>
+              <a:t> and it’s the result of invalid calculations (e.g. 3 * ‘hi’)</a:t>
+            </a:r>
+            <a:endParaRPr lang="en-US" dirty="0">
+              <a:solidFill>
+                <a:srgbClr val="7030A0"/>
+              </a:solidFill>
+              <a:latin typeface="Calibri (Corps)"/>
+              <a:cs typeface="Segoe UI Light" panose="020B0502040204020203" pitchFamily="34" charset="0"/>
+            </a:endParaRPr>
+          </a:p>
+        </p:txBody>
+      </p:sp>
+    </p:spTree>
+    <p:extLst>
+      <p:ext uri="{BB962C8B-B14F-4D97-AF65-F5344CB8AC3E}">
+        <p14:creationId xmlns:p14="http://schemas.microsoft.com/office/powerpoint/2010/main" val="830554536"/>
       </p:ext>
     </p:extLst>
   </p:cSld>

</xml_diff>